<commit_message>
updated models in presentation to be the corrected ones
</commit_message>
<xml_diff>
--- a/yh_labb/presentation/presentation.pptx
+++ b/yh_labb/presentation/presentation.pptx
@@ -3362,10 +3362,10 @@
       </p:grpSpPr>
       <p:pic>
         <p:nvPicPr>
-          <p:cNvPr id="5" name="Picture 4">
-            <a:extLst>
-              <a:ext uri="{FF2B5EF4-FFF2-40B4-BE49-F238E27FC236}">
-                <a16:creationId xmlns:a16="http://schemas.microsoft.com/office/drawing/2014/main" id="{E6009A33-827E-D560-8DB6-10D693A5B869}"/>
+          <p:cNvPr id="3" name="Picture 2">
+            <a:extLst>
+              <a:ext uri="{FF2B5EF4-FFF2-40B4-BE49-F238E27FC236}">
+                <a16:creationId xmlns:a16="http://schemas.microsoft.com/office/drawing/2014/main" id="{335D4076-73C9-EF5C-2A8D-B068AAF033F7}"/>
               </a:ext>
             </a:extLst>
           </p:cNvPr>
@@ -3388,8 +3388,8 @@
         </p:blipFill>
         <p:spPr>
           <a:xfrm>
-            <a:off x="819801" y="363450"/>
-            <a:ext cx="10552398" cy="6131099"/>
+            <a:off x="819802" y="360940"/>
+            <a:ext cx="10543764" cy="6131100"/>
           </a:xfrm>
           <a:prstGeom prst="rect">
             <a:avLst/>
@@ -3434,10 +3434,10 @@
       </p:grpSpPr>
       <p:pic>
         <p:nvPicPr>
-          <p:cNvPr id="5" name="Picture 4">
-            <a:extLst>
-              <a:ext uri="{FF2B5EF4-FFF2-40B4-BE49-F238E27FC236}">
-                <a16:creationId xmlns:a16="http://schemas.microsoft.com/office/drawing/2014/main" id="{568A681B-B56E-2D87-3415-8EEB27082DBB}"/>
+          <p:cNvPr id="6" name="Picture 5">
+            <a:extLst>
+              <a:ext uri="{FF2B5EF4-FFF2-40B4-BE49-F238E27FC236}">
+                <a16:creationId xmlns:a16="http://schemas.microsoft.com/office/drawing/2014/main" id="{8471B0AA-4841-345D-4B0C-A9CA3CF84DCE}"/>
               </a:ext>
             </a:extLst>
           </p:cNvPr>
@@ -3460,8 +3460,8 @@
         </p:blipFill>
         <p:spPr>
           <a:xfrm>
-            <a:off x="819801" y="363450"/>
-            <a:ext cx="10552398" cy="6131099"/>
+            <a:off x="819802" y="360940"/>
+            <a:ext cx="10543764" cy="6131100"/>
           </a:xfrm>
           <a:prstGeom prst="rect">
             <a:avLst/>
@@ -3779,10 +3779,10 @@
       </p:grpSpPr>
       <p:pic>
         <p:nvPicPr>
-          <p:cNvPr id="5" name="Picture 4">
-            <a:extLst>
-              <a:ext uri="{FF2B5EF4-FFF2-40B4-BE49-F238E27FC236}">
-                <a16:creationId xmlns:a16="http://schemas.microsoft.com/office/drawing/2014/main" id="{531CBFBD-852A-0753-F128-A572FEA736CD}"/>
+          <p:cNvPr id="2" name="Picture 1">
+            <a:extLst>
+              <a:ext uri="{FF2B5EF4-FFF2-40B4-BE49-F238E27FC236}">
+                <a16:creationId xmlns:a16="http://schemas.microsoft.com/office/drawing/2014/main" id="{11D3A295-C1CC-765D-6862-344968388362}"/>
               </a:ext>
             </a:extLst>
           </p:cNvPr>
@@ -3805,8 +3805,8 @@
         </p:blipFill>
         <p:spPr>
           <a:xfrm>
-            <a:off x="819801" y="363450"/>
-            <a:ext cx="10552398" cy="6131099"/>
+            <a:off x="819802" y="360940"/>
+            <a:ext cx="10543764" cy="6131100"/>
           </a:xfrm>
           <a:prstGeom prst="rect">
             <a:avLst/>
@@ -3905,10 +3905,10 @@
       </p:grpSpPr>
       <p:pic>
         <p:nvPicPr>
-          <p:cNvPr id="5" name="Picture 4">
-            <a:extLst>
-              <a:ext uri="{FF2B5EF4-FFF2-40B4-BE49-F238E27FC236}">
-                <a16:creationId xmlns:a16="http://schemas.microsoft.com/office/drawing/2014/main" id="{9B11C4F8-8754-6087-6226-A36007B4BAB4}"/>
+          <p:cNvPr id="3" name="Picture 2">
+            <a:extLst>
+              <a:ext uri="{FF2B5EF4-FFF2-40B4-BE49-F238E27FC236}">
+                <a16:creationId xmlns:a16="http://schemas.microsoft.com/office/drawing/2014/main" id="{BF3AC925-00B5-0F5E-E588-76F942A89343}"/>
               </a:ext>
             </a:extLst>
           </p:cNvPr>
@@ -3931,8 +3931,8 @@
         </p:blipFill>
         <p:spPr>
           <a:xfrm>
-            <a:off x="819801" y="363450"/>
-            <a:ext cx="10552398" cy="6131099"/>
+            <a:off x="819802" y="360940"/>
+            <a:ext cx="10543764" cy="6131100"/>
           </a:xfrm>
           <a:prstGeom prst="rect">
             <a:avLst/>
@@ -4034,10 +4034,10 @@
       </p:grpSpPr>
       <p:pic>
         <p:nvPicPr>
-          <p:cNvPr id="5" name="Picture 4">
-            <a:extLst>
-              <a:ext uri="{FF2B5EF4-FFF2-40B4-BE49-F238E27FC236}">
-                <a16:creationId xmlns:a16="http://schemas.microsoft.com/office/drawing/2014/main" id="{4AA0C99D-A3CB-47BE-4DCC-CF38CDD9B4D5}"/>
+          <p:cNvPr id="2" name="Picture 1">
+            <a:extLst>
+              <a:ext uri="{FF2B5EF4-FFF2-40B4-BE49-F238E27FC236}">
+                <a16:creationId xmlns:a16="http://schemas.microsoft.com/office/drawing/2014/main" id="{6367780F-A398-AA9A-0C0C-45AF86659F39}"/>
               </a:ext>
             </a:extLst>
           </p:cNvPr>
@@ -4060,8 +4060,8 @@
         </p:blipFill>
         <p:spPr>
           <a:xfrm>
-            <a:off x="819801" y="363450"/>
-            <a:ext cx="10552398" cy="6131099"/>
+            <a:off x="819802" y="360940"/>
+            <a:ext cx="10543764" cy="6131100"/>
           </a:xfrm>
           <a:prstGeom prst="rect">
             <a:avLst/>
@@ -4214,10 +4214,10 @@
       </p:grpSpPr>
       <p:pic>
         <p:nvPicPr>
-          <p:cNvPr id="5" name="Picture 4">
-            <a:extLst>
-              <a:ext uri="{FF2B5EF4-FFF2-40B4-BE49-F238E27FC236}">
-                <a16:creationId xmlns:a16="http://schemas.microsoft.com/office/drawing/2014/main" id="{0CFA1C36-61A5-7B35-BE24-9EF189C879EA}"/>
+          <p:cNvPr id="2" name="Picture 1">
+            <a:extLst>
+              <a:ext uri="{FF2B5EF4-FFF2-40B4-BE49-F238E27FC236}">
+                <a16:creationId xmlns:a16="http://schemas.microsoft.com/office/drawing/2014/main" id="{3EFD0126-81AD-8C62-51E7-3ADCE6333420}"/>
               </a:ext>
             </a:extLst>
           </p:cNvPr>
@@ -4240,8 +4240,8 @@
         </p:blipFill>
         <p:spPr>
           <a:xfrm>
-            <a:off x="819801" y="363450"/>
-            <a:ext cx="10552398" cy="6131099"/>
+            <a:off x="819802" y="360940"/>
+            <a:ext cx="10543764" cy="6131100"/>
           </a:xfrm>
           <a:prstGeom prst="rect">
             <a:avLst/>
@@ -4334,10 +4334,10 @@
       </p:grpSpPr>
       <p:pic>
         <p:nvPicPr>
-          <p:cNvPr id="3" name="Picture 2">
-            <a:extLst>
-              <a:ext uri="{FF2B5EF4-FFF2-40B4-BE49-F238E27FC236}">
-                <a16:creationId xmlns:a16="http://schemas.microsoft.com/office/drawing/2014/main" id="{DC1C9F4A-FFD5-0939-AF4E-5986361FAE25}"/>
+          <p:cNvPr id="6" name="Picture 5">
+            <a:extLst>
+              <a:ext uri="{FF2B5EF4-FFF2-40B4-BE49-F238E27FC236}">
+                <a16:creationId xmlns:a16="http://schemas.microsoft.com/office/drawing/2014/main" id="{6DBC5C09-E64D-9DD1-1D8A-72100E29C81C}"/>
               </a:ext>
             </a:extLst>
           </p:cNvPr>
@@ -4360,8 +4360,8 @@
         </p:blipFill>
         <p:spPr>
           <a:xfrm>
-            <a:off x="1544375" y="270653"/>
-            <a:ext cx="9103250" cy="6316694"/>
+            <a:off x="1544375" y="310780"/>
+            <a:ext cx="9107005" cy="6239012"/>
           </a:xfrm>
           <a:prstGeom prst="rect">
             <a:avLst/>
@@ -4406,10 +4406,10 @@
       </p:grpSpPr>
       <p:pic>
         <p:nvPicPr>
-          <p:cNvPr id="3" name="Picture 2">
-            <a:extLst>
-              <a:ext uri="{FF2B5EF4-FFF2-40B4-BE49-F238E27FC236}">
-                <a16:creationId xmlns:a16="http://schemas.microsoft.com/office/drawing/2014/main" id="{880262B1-4F7B-6A90-73CA-AD80D0D0C2D8}"/>
+          <p:cNvPr id="11" name="Picture 10">
+            <a:extLst>
+              <a:ext uri="{FF2B5EF4-FFF2-40B4-BE49-F238E27FC236}">
+                <a16:creationId xmlns:a16="http://schemas.microsoft.com/office/drawing/2014/main" id="{FDCD0654-1B0F-A5A9-382A-410A81B2A3C0}"/>
               </a:ext>
             </a:extLst>
           </p:cNvPr>
@@ -4432,8 +4432,8 @@
         </p:blipFill>
         <p:spPr>
           <a:xfrm>
-            <a:off x="1544375" y="270653"/>
-            <a:ext cx="9103250" cy="6316694"/>
+            <a:off x="1544375" y="310780"/>
+            <a:ext cx="9107005" cy="6239012"/>
           </a:xfrm>
           <a:prstGeom prst="rect">
             <a:avLst/>
@@ -4454,8 +4454,8 @@
         </p:nvSpPr>
         <p:spPr>
           <a:xfrm>
-            <a:off x="1439501" y="172017"/>
-            <a:ext cx="4209861" cy="2100404"/>
+            <a:off x="1361783" y="226337"/>
+            <a:ext cx="4287579" cy="2046084"/>
           </a:xfrm>
           <a:prstGeom prst="rect">
             <a:avLst/>
@@ -4509,7 +4509,7 @@
         <p:spPr>
           <a:xfrm>
             <a:off x="6167527" y="1937442"/>
-            <a:ext cx="1881004" cy="4463358"/>
+            <a:ext cx="1881004" cy="4418091"/>
           </a:xfrm>
           <a:prstGeom prst="rect">
             <a:avLst/>
@@ -4562,8 +4562,8 @@
         </p:nvSpPr>
         <p:spPr>
           <a:xfrm>
-            <a:off x="3766242" y="3847723"/>
-            <a:ext cx="2401283" cy="2553077"/>
+            <a:off x="3766242" y="4246076"/>
+            <a:ext cx="2401283" cy="2109458"/>
           </a:xfrm>
           <a:prstGeom prst="rect">
             <a:avLst/>
@@ -4670,8 +4670,8 @@
         </p:nvSpPr>
         <p:spPr>
           <a:xfrm>
-            <a:off x="6167526" y="158991"/>
-            <a:ext cx="4287579" cy="1669809"/>
+            <a:off x="6167526" y="226337"/>
+            <a:ext cx="4287579" cy="1602463"/>
           </a:xfrm>
           <a:prstGeom prst="rect">
             <a:avLst/>
@@ -4724,8 +4724,8 @@
         </p:nvSpPr>
         <p:spPr>
           <a:xfrm>
-            <a:off x="3766242" y="2399168"/>
-            <a:ext cx="1883120" cy="1240325"/>
+            <a:off x="3766242" y="2525917"/>
+            <a:ext cx="1883120" cy="1439501"/>
           </a:xfrm>
           <a:prstGeom prst="rect">
             <a:avLst/>

</xml_diff>

<commit_message>
updated version of logical model
</commit_message>
<xml_diff>
--- a/yh_labb/presentation/presentation.pptx
+++ b/yh_labb/presentation/presentation.pptx
@@ -4334,10 +4334,10 @@
       </p:grpSpPr>
       <p:pic>
         <p:nvPicPr>
-          <p:cNvPr id="6" name="Picture 5">
-            <a:extLst>
-              <a:ext uri="{FF2B5EF4-FFF2-40B4-BE49-F238E27FC236}">
-                <a16:creationId xmlns:a16="http://schemas.microsoft.com/office/drawing/2014/main" id="{6DBC5C09-E64D-9DD1-1D8A-72100E29C81C}"/>
+          <p:cNvPr id="8" name="Picture 7">
+            <a:extLst>
+              <a:ext uri="{FF2B5EF4-FFF2-40B4-BE49-F238E27FC236}">
+                <a16:creationId xmlns:a16="http://schemas.microsoft.com/office/drawing/2014/main" id="{83C1FB1F-6DDF-8E71-7441-C1C7ECAC038D}"/>
               </a:ext>
             </a:extLst>
           </p:cNvPr>
@@ -4360,8 +4360,8 @@
         </p:blipFill>
         <p:spPr>
           <a:xfrm>
-            <a:off x="1544375" y="310780"/>
-            <a:ext cx="9107005" cy="6239012"/>
+            <a:off x="1540620" y="308206"/>
+            <a:ext cx="9107006" cy="6239013"/>
           </a:xfrm>
           <a:prstGeom prst="rect">
             <a:avLst/>
@@ -4406,10 +4406,10 @@
       </p:grpSpPr>
       <p:pic>
         <p:nvPicPr>
-          <p:cNvPr id="11" name="Picture 10">
-            <a:extLst>
-              <a:ext uri="{FF2B5EF4-FFF2-40B4-BE49-F238E27FC236}">
-                <a16:creationId xmlns:a16="http://schemas.microsoft.com/office/drawing/2014/main" id="{FDCD0654-1B0F-A5A9-382A-410A81B2A3C0}"/>
+          <p:cNvPr id="12" name="Picture 11">
+            <a:extLst>
+              <a:ext uri="{FF2B5EF4-FFF2-40B4-BE49-F238E27FC236}">
+                <a16:creationId xmlns:a16="http://schemas.microsoft.com/office/drawing/2014/main" id="{602B1391-C86B-58DE-192F-A990A98D025D}"/>
               </a:ext>
             </a:extLst>
           </p:cNvPr>
@@ -4432,8 +4432,8 @@
         </p:blipFill>
         <p:spPr>
           <a:xfrm>
-            <a:off x="1544375" y="310780"/>
-            <a:ext cx="9107005" cy="6239012"/>
+            <a:off x="1540620" y="308206"/>
+            <a:ext cx="9107006" cy="6239013"/>
           </a:xfrm>
           <a:prstGeom prst="rect">
             <a:avLst/>
@@ -4455,7 +4455,7 @@
         <p:spPr>
           <a:xfrm>
             <a:off x="1361783" y="226337"/>
-            <a:ext cx="4287579" cy="2046084"/>
+            <a:ext cx="4287579" cy="1828800"/>
           </a:xfrm>
           <a:prstGeom prst="rect">
             <a:avLst/>
@@ -4724,7 +4724,7 @@
         </p:nvSpPr>
         <p:spPr>
           <a:xfrm>
-            <a:off x="3766242" y="2525917"/>
+            <a:off x="3766242" y="2299577"/>
             <a:ext cx="1883120" cy="1439501"/>
           </a:xfrm>
           <a:prstGeom prst="rect">

</xml_diff>

<commit_message>
added animations to presentation
</commit_message>
<xml_diff>
--- a/yh_labb/presentation/presentation.pptx
+++ b/yh_labb/presentation/presentation.pptx
@@ -5,14 +5,8 @@
     <p:sldMasterId id="2147483648" r:id="rId1"/>
   </p:sldMasterIdLst>
   <p:sldIdLst>
-    <p:sldId id="258" r:id="rId2"/>
-    <p:sldId id="263" r:id="rId3"/>
-    <p:sldId id="261" r:id="rId4"/>
-    <p:sldId id="262" r:id="rId5"/>
-    <p:sldId id="259" r:id="rId6"/>
-    <p:sldId id="260" r:id="rId7"/>
-    <p:sldId id="257" r:id="rId8"/>
-    <p:sldId id="264" r:id="rId9"/>
+    <p:sldId id="263" r:id="rId2"/>
+    <p:sldId id="264" r:id="rId3"/>
   </p:sldIdLst>
   <p:sldSz cx="12192000" cy="6858000"/>
   <p:notesSz cx="6858000" cy="9144000"/>
@@ -268,7 +262,7 @@
           <a:p>
             <a:fld id="{7A98FA03-1A3B-45A1-AF81-10310EEDDF7C}" type="datetimeFigureOut">
               <a:rPr lang="en-SE" smtClean="0"/>
-              <a:t>2026-02-16</a:t>
+              <a:t>2026-02-22</a:t>
             </a:fld>
             <a:endParaRPr lang="en-SE"/>
           </a:p>
@@ -468,7 +462,7 @@
           <a:p>
             <a:fld id="{7A98FA03-1A3B-45A1-AF81-10310EEDDF7C}" type="datetimeFigureOut">
               <a:rPr lang="en-SE" smtClean="0"/>
-              <a:t>2026-02-16</a:t>
+              <a:t>2026-02-22</a:t>
             </a:fld>
             <a:endParaRPr lang="en-SE"/>
           </a:p>
@@ -678,7 +672,7 @@
           <a:p>
             <a:fld id="{7A98FA03-1A3B-45A1-AF81-10310EEDDF7C}" type="datetimeFigureOut">
               <a:rPr lang="en-SE" smtClean="0"/>
-              <a:t>2026-02-16</a:t>
+              <a:t>2026-02-22</a:t>
             </a:fld>
             <a:endParaRPr lang="en-SE"/>
           </a:p>
@@ -878,7 +872,7 @@
           <a:p>
             <a:fld id="{7A98FA03-1A3B-45A1-AF81-10310EEDDF7C}" type="datetimeFigureOut">
               <a:rPr lang="en-SE" smtClean="0"/>
-              <a:t>2026-02-16</a:t>
+              <a:t>2026-02-22</a:t>
             </a:fld>
             <a:endParaRPr lang="en-SE"/>
           </a:p>
@@ -1154,7 +1148,7 @@
           <a:p>
             <a:fld id="{7A98FA03-1A3B-45A1-AF81-10310EEDDF7C}" type="datetimeFigureOut">
               <a:rPr lang="en-SE" smtClean="0"/>
-              <a:t>2026-02-16</a:t>
+              <a:t>2026-02-22</a:t>
             </a:fld>
             <a:endParaRPr lang="en-SE"/>
           </a:p>
@@ -1422,7 +1416,7 @@
           <a:p>
             <a:fld id="{7A98FA03-1A3B-45A1-AF81-10310EEDDF7C}" type="datetimeFigureOut">
               <a:rPr lang="en-SE" smtClean="0"/>
-              <a:t>2026-02-16</a:t>
+              <a:t>2026-02-22</a:t>
             </a:fld>
             <a:endParaRPr lang="en-SE"/>
           </a:p>
@@ -1837,7 +1831,7 @@
           <a:p>
             <a:fld id="{7A98FA03-1A3B-45A1-AF81-10310EEDDF7C}" type="datetimeFigureOut">
               <a:rPr lang="en-SE" smtClean="0"/>
-              <a:t>2026-02-16</a:t>
+              <a:t>2026-02-22</a:t>
             </a:fld>
             <a:endParaRPr lang="en-SE"/>
           </a:p>
@@ -1979,7 +1973,7 @@
           <a:p>
             <a:fld id="{7A98FA03-1A3B-45A1-AF81-10310EEDDF7C}" type="datetimeFigureOut">
               <a:rPr lang="en-SE" smtClean="0"/>
-              <a:t>2026-02-16</a:t>
+              <a:t>2026-02-22</a:t>
             </a:fld>
             <a:endParaRPr lang="en-SE"/>
           </a:p>
@@ -2092,7 +2086,7 @@
           <a:p>
             <a:fld id="{7A98FA03-1A3B-45A1-AF81-10310EEDDF7C}" type="datetimeFigureOut">
               <a:rPr lang="en-SE" smtClean="0"/>
-              <a:t>2026-02-16</a:t>
+              <a:t>2026-02-22</a:t>
             </a:fld>
             <a:endParaRPr lang="en-SE"/>
           </a:p>
@@ -2405,7 +2399,7 @@
           <a:p>
             <a:fld id="{7A98FA03-1A3B-45A1-AF81-10310EEDDF7C}" type="datetimeFigureOut">
               <a:rPr lang="en-SE" smtClean="0"/>
-              <a:t>2026-02-16</a:t>
+              <a:t>2026-02-22</a:t>
             </a:fld>
             <a:endParaRPr lang="en-SE"/>
           </a:p>
@@ -2694,7 +2688,7 @@
           <a:p>
             <a:fld id="{7A98FA03-1A3B-45A1-AF81-10310EEDDF7C}" type="datetimeFigureOut">
               <a:rPr lang="en-SE" smtClean="0"/>
-              <a:t>2026-02-16</a:t>
+              <a:t>2026-02-22</a:t>
             </a:fld>
             <a:endParaRPr lang="en-SE"/>
           </a:p>
@@ -2937,7 +2931,7 @@
           <a:p>
             <a:fld id="{7A98FA03-1A3B-45A1-AF81-10310EEDDF7C}" type="datetimeFigureOut">
               <a:rPr lang="en-SE" smtClean="0"/>
-              <a:t>2026-02-16</a:t>
+              <a:t>2026-02-22</a:t>
             </a:fld>
             <a:endParaRPr lang="en-SE"/>
           </a:p>
@@ -3345,78 +3339,6 @@
         <p:cNvPr id="1" name="">
           <a:extLst>
             <a:ext uri="{FF2B5EF4-FFF2-40B4-BE49-F238E27FC236}">
-              <a16:creationId xmlns:a16="http://schemas.microsoft.com/office/drawing/2014/main" id="{283923CD-AB5E-E5D5-B0A3-09E8D0DB61CA}"/>
-            </a:ext>
-          </a:extLst>
-        </p:cNvPr>
-        <p:cNvGrpSpPr/>
-        <p:nvPr/>
-      </p:nvGrpSpPr>
-      <p:grpSpPr>
-        <a:xfrm>
-          <a:off x="0" y="0"/>
-          <a:ext cx="0" cy="0"/>
-          <a:chOff x="0" y="0"/>
-          <a:chExt cx="0" cy="0"/>
-        </a:xfrm>
-      </p:grpSpPr>
-      <p:pic>
-        <p:nvPicPr>
-          <p:cNvPr id="3" name="Picture 2">
-            <a:extLst>
-              <a:ext uri="{FF2B5EF4-FFF2-40B4-BE49-F238E27FC236}">
-                <a16:creationId xmlns:a16="http://schemas.microsoft.com/office/drawing/2014/main" id="{335D4076-73C9-EF5C-2A8D-B068AAF033F7}"/>
-              </a:ext>
-            </a:extLst>
-          </p:cNvPr>
-          <p:cNvPicPr>
-            <a:picLocks noChangeAspect="1"/>
-          </p:cNvPicPr>
-          <p:nvPr/>
-        </p:nvPicPr>
-        <p:blipFill>
-          <a:blip r:embed="rId2">
-            <a:extLst>
-              <a:ext uri="{28A0092B-C50C-407E-A947-70E740481C1C}">
-                <a14:useLocalDpi xmlns:a14="http://schemas.microsoft.com/office/drawing/2010/main" val="0"/>
-              </a:ext>
-            </a:extLst>
-          </a:blip>
-          <a:stretch>
-            <a:fillRect/>
-          </a:stretch>
-        </p:blipFill>
-        <p:spPr>
-          <a:xfrm>
-            <a:off x="819802" y="360940"/>
-            <a:ext cx="10543764" cy="6131100"/>
-          </a:xfrm>
-          <a:prstGeom prst="rect">
-            <a:avLst/>
-          </a:prstGeom>
-        </p:spPr>
-      </p:pic>
-    </p:spTree>
-    <p:extLst>
-      <p:ext uri="{BB962C8B-B14F-4D97-AF65-F5344CB8AC3E}">
-        <p14:creationId xmlns:p14="http://schemas.microsoft.com/office/powerpoint/2010/main" val="1610387243"/>
-      </p:ext>
-    </p:extLst>
-  </p:cSld>
-  <p:clrMapOvr>
-    <a:masterClrMapping/>
-  </p:clrMapOvr>
-</p:sld>
-</file>
-
-<file path=ppt/slides/slide2.xml><?xml version="1.0" encoding="utf-8"?>
-<p:sld xmlns:a="http://schemas.openxmlformats.org/drawingml/2006/main" xmlns:r="http://schemas.openxmlformats.org/officeDocument/2006/relationships" xmlns:p="http://schemas.openxmlformats.org/presentationml/2006/main">
-  <p:cSld>
-    <p:spTree>
-      <p:nvGrpSpPr>
-        <p:cNvPr id="1" name="">
-          <a:extLst>
-            <a:ext uri="{FF2B5EF4-FFF2-40B4-BE49-F238E27FC236}">
               <a16:creationId xmlns:a16="http://schemas.microsoft.com/office/drawing/2014/main" id="{028A65DE-5BC8-B512-69ED-09CB807D1DB6}"/>
             </a:ext>
           </a:extLst>
@@ -3751,637 +3673,708 @@
   <p:clrMapOvr>
     <a:masterClrMapping/>
   </p:clrMapOvr>
+  <p:timing>
+    <p:tnLst>
+      <p:par>
+        <p:cTn id="1" dur="indefinite" restart="never" nodeType="tmRoot">
+          <p:childTnLst>
+            <p:seq concurrent="1" nextAc="seek">
+              <p:cTn id="2" dur="indefinite" nodeType="mainSeq">
+                <p:childTnLst>
+                  <p:par>
+                    <p:cTn id="3" fill="hold">
+                      <p:stCondLst>
+                        <p:cond delay="indefinite"/>
+                      </p:stCondLst>
+                      <p:childTnLst>
+                        <p:par>
+                          <p:cTn id="4" fill="hold">
+                            <p:stCondLst>
+                              <p:cond delay="0"/>
+                            </p:stCondLst>
+                            <p:childTnLst>
+                              <p:par>
+                                <p:cTn id="5" presetID="10" presetClass="entr" presetSubtype="0" fill="hold" grpId="0" nodeType="clickEffect">
+                                  <p:stCondLst>
+                                    <p:cond delay="0"/>
+                                  </p:stCondLst>
+                                  <p:childTnLst>
+                                    <p:set>
+                                      <p:cBhvr>
+                                        <p:cTn id="6" dur="1" fill="hold">
+                                          <p:stCondLst>
+                                            <p:cond delay="0"/>
+                                          </p:stCondLst>
+                                        </p:cTn>
+                                        <p:tgtEl>
+                                          <p:spTgt spid="2"/>
+                                        </p:tgtEl>
+                                        <p:attrNameLst>
+                                          <p:attrName>style.visibility</p:attrName>
+                                        </p:attrNameLst>
+                                      </p:cBhvr>
+                                      <p:to>
+                                        <p:strVal val="visible"/>
+                                      </p:to>
+                                    </p:set>
+                                    <p:animEffect transition="in" filter="fade">
+                                      <p:cBhvr>
+                                        <p:cTn id="7" dur="500"/>
+                                        <p:tgtEl>
+                                          <p:spTgt spid="2"/>
+                                        </p:tgtEl>
+                                      </p:cBhvr>
+                                    </p:animEffect>
+                                  </p:childTnLst>
+                                </p:cTn>
+                              </p:par>
+                              <p:par>
+                                <p:cTn id="8" presetID="10" presetClass="entr" presetSubtype="0" fill="hold" grpId="0" nodeType="withEffect">
+                                  <p:stCondLst>
+                                    <p:cond delay="0"/>
+                                  </p:stCondLst>
+                                  <p:childTnLst>
+                                    <p:set>
+                                      <p:cBhvr>
+                                        <p:cTn id="9" dur="1" fill="hold">
+                                          <p:stCondLst>
+                                            <p:cond delay="0"/>
+                                          </p:stCondLst>
+                                        </p:cTn>
+                                        <p:tgtEl>
+                                          <p:spTgt spid="3"/>
+                                        </p:tgtEl>
+                                        <p:attrNameLst>
+                                          <p:attrName>style.visibility</p:attrName>
+                                        </p:attrNameLst>
+                                      </p:cBhvr>
+                                      <p:to>
+                                        <p:strVal val="visible"/>
+                                      </p:to>
+                                    </p:set>
+                                    <p:animEffect transition="in" filter="fade">
+                                      <p:cBhvr>
+                                        <p:cTn id="10" dur="500"/>
+                                        <p:tgtEl>
+                                          <p:spTgt spid="3"/>
+                                        </p:tgtEl>
+                                      </p:cBhvr>
+                                    </p:animEffect>
+                                  </p:childTnLst>
+                                </p:cTn>
+                              </p:par>
+                              <p:par>
+                                <p:cTn id="11" presetID="10" presetClass="entr" presetSubtype="0" fill="hold" grpId="0" nodeType="withEffect">
+                                  <p:stCondLst>
+                                    <p:cond delay="0"/>
+                                  </p:stCondLst>
+                                  <p:childTnLst>
+                                    <p:set>
+                                      <p:cBhvr>
+                                        <p:cTn id="12" dur="1" fill="hold">
+                                          <p:stCondLst>
+                                            <p:cond delay="0"/>
+                                          </p:stCondLst>
+                                        </p:cTn>
+                                        <p:tgtEl>
+                                          <p:spTgt spid="4"/>
+                                        </p:tgtEl>
+                                        <p:attrNameLst>
+                                          <p:attrName>style.visibility</p:attrName>
+                                        </p:attrNameLst>
+                                      </p:cBhvr>
+                                      <p:to>
+                                        <p:strVal val="visible"/>
+                                      </p:to>
+                                    </p:set>
+                                    <p:animEffect transition="in" filter="fade">
+                                      <p:cBhvr>
+                                        <p:cTn id="13" dur="500"/>
+                                        <p:tgtEl>
+                                          <p:spTgt spid="4"/>
+                                        </p:tgtEl>
+                                      </p:cBhvr>
+                                    </p:animEffect>
+                                  </p:childTnLst>
+                                </p:cTn>
+                              </p:par>
+                              <p:par>
+                                <p:cTn id="14" presetID="10" presetClass="entr" presetSubtype="0" fill="hold" grpId="0" nodeType="withEffect">
+                                  <p:stCondLst>
+                                    <p:cond delay="0"/>
+                                  </p:stCondLst>
+                                  <p:childTnLst>
+                                    <p:set>
+                                      <p:cBhvr>
+                                        <p:cTn id="15" dur="1" fill="hold">
+                                          <p:stCondLst>
+                                            <p:cond delay="0"/>
+                                          </p:stCondLst>
+                                        </p:cTn>
+                                        <p:tgtEl>
+                                          <p:spTgt spid="11"/>
+                                        </p:tgtEl>
+                                        <p:attrNameLst>
+                                          <p:attrName>style.visibility</p:attrName>
+                                        </p:attrNameLst>
+                                      </p:cBhvr>
+                                      <p:to>
+                                        <p:strVal val="visible"/>
+                                      </p:to>
+                                    </p:set>
+                                    <p:animEffect transition="in" filter="fade">
+                                      <p:cBhvr>
+                                        <p:cTn id="16" dur="500"/>
+                                        <p:tgtEl>
+                                          <p:spTgt spid="11"/>
+                                        </p:tgtEl>
+                                      </p:cBhvr>
+                                    </p:animEffect>
+                                  </p:childTnLst>
+                                </p:cTn>
+                              </p:par>
+                              <p:par>
+                                <p:cTn id="17" presetID="10" presetClass="entr" presetSubtype="0" fill="hold" grpId="0" nodeType="withEffect">
+                                  <p:stCondLst>
+                                    <p:cond delay="0"/>
+                                  </p:stCondLst>
+                                  <p:childTnLst>
+                                    <p:set>
+                                      <p:cBhvr>
+                                        <p:cTn id="18" dur="1" fill="hold">
+                                          <p:stCondLst>
+                                            <p:cond delay="0"/>
+                                          </p:stCondLst>
+                                        </p:cTn>
+                                        <p:tgtEl>
+                                          <p:spTgt spid="12"/>
+                                        </p:tgtEl>
+                                        <p:attrNameLst>
+                                          <p:attrName>style.visibility</p:attrName>
+                                        </p:attrNameLst>
+                                      </p:cBhvr>
+                                      <p:to>
+                                        <p:strVal val="visible"/>
+                                      </p:to>
+                                    </p:set>
+                                    <p:animEffect transition="in" filter="fade">
+                                      <p:cBhvr>
+                                        <p:cTn id="19" dur="500"/>
+                                        <p:tgtEl>
+                                          <p:spTgt spid="12"/>
+                                        </p:tgtEl>
+                                      </p:cBhvr>
+                                    </p:animEffect>
+                                  </p:childTnLst>
+                                </p:cTn>
+                              </p:par>
+                            </p:childTnLst>
+                          </p:cTn>
+                        </p:par>
+                      </p:childTnLst>
+                    </p:cTn>
+                  </p:par>
+                  <p:par>
+                    <p:cTn id="20" fill="hold">
+                      <p:stCondLst>
+                        <p:cond delay="indefinite"/>
+                      </p:stCondLst>
+                      <p:childTnLst>
+                        <p:par>
+                          <p:cTn id="21" fill="hold">
+                            <p:stCondLst>
+                              <p:cond delay="0"/>
+                            </p:stCondLst>
+                            <p:childTnLst>
+                              <p:par>
+                                <p:cTn id="22" presetID="10" presetClass="exit" presetSubtype="0" fill="hold" grpId="1" nodeType="clickEffect">
+                                  <p:stCondLst>
+                                    <p:cond delay="0"/>
+                                  </p:stCondLst>
+                                  <p:childTnLst>
+                                    <p:animEffect transition="out" filter="fade">
+                                      <p:cBhvr>
+                                        <p:cTn id="23" dur="250"/>
+                                        <p:tgtEl>
+                                          <p:spTgt spid="2"/>
+                                        </p:tgtEl>
+                                      </p:cBhvr>
+                                    </p:animEffect>
+                                    <p:set>
+                                      <p:cBhvr>
+                                        <p:cTn id="24" dur="1" fill="hold">
+                                          <p:stCondLst>
+                                            <p:cond delay="249"/>
+                                          </p:stCondLst>
+                                        </p:cTn>
+                                        <p:tgtEl>
+                                          <p:spTgt spid="2"/>
+                                        </p:tgtEl>
+                                        <p:attrNameLst>
+                                          <p:attrName>style.visibility</p:attrName>
+                                        </p:attrNameLst>
+                                      </p:cBhvr>
+                                      <p:to>
+                                        <p:strVal val="hidden"/>
+                                      </p:to>
+                                    </p:set>
+                                  </p:childTnLst>
+                                </p:cTn>
+                              </p:par>
+                              <p:par>
+                                <p:cTn id="25" presetID="10" presetClass="exit" presetSubtype="0" fill="hold" grpId="1" nodeType="withEffect">
+                                  <p:stCondLst>
+                                    <p:cond delay="0"/>
+                                  </p:stCondLst>
+                                  <p:childTnLst>
+                                    <p:animEffect transition="out" filter="fade">
+                                      <p:cBhvr>
+                                        <p:cTn id="26" dur="250"/>
+                                        <p:tgtEl>
+                                          <p:spTgt spid="4"/>
+                                        </p:tgtEl>
+                                      </p:cBhvr>
+                                    </p:animEffect>
+                                    <p:set>
+                                      <p:cBhvr>
+                                        <p:cTn id="27" dur="1" fill="hold">
+                                          <p:stCondLst>
+                                            <p:cond delay="249"/>
+                                          </p:stCondLst>
+                                        </p:cTn>
+                                        <p:tgtEl>
+                                          <p:spTgt spid="4"/>
+                                        </p:tgtEl>
+                                        <p:attrNameLst>
+                                          <p:attrName>style.visibility</p:attrName>
+                                        </p:attrNameLst>
+                                      </p:cBhvr>
+                                      <p:to>
+                                        <p:strVal val="hidden"/>
+                                      </p:to>
+                                    </p:set>
+                                  </p:childTnLst>
+                                </p:cTn>
+                              </p:par>
+                              <p:par>
+                                <p:cTn id="28" presetID="10" presetClass="exit" presetSubtype="0" fill="hold" grpId="1" nodeType="withEffect">
+                                  <p:stCondLst>
+                                    <p:cond delay="0"/>
+                                  </p:stCondLst>
+                                  <p:childTnLst>
+                                    <p:animEffect transition="out" filter="fade">
+                                      <p:cBhvr>
+                                        <p:cTn id="29" dur="250"/>
+                                        <p:tgtEl>
+                                          <p:spTgt spid="11"/>
+                                        </p:tgtEl>
+                                      </p:cBhvr>
+                                    </p:animEffect>
+                                    <p:set>
+                                      <p:cBhvr>
+                                        <p:cTn id="30" dur="1" fill="hold">
+                                          <p:stCondLst>
+                                            <p:cond delay="249"/>
+                                          </p:stCondLst>
+                                        </p:cTn>
+                                        <p:tgtEl>
+                                          <p:spTgt spid="11"/>
+                                        </p:tgtEl>
+                                        <p:attrNameLst>
+                                          <p:attrName>style.visibility</p:attrName>
+                                        </p:attrNameLst>
+                                      </p:cBhvr>
+                                      <p:to>
+                                        <p:strVal val="hidden"/>
+                                      </p:to>
+                                    </p:set>
+                                  </p:childTnLst>
+                                </p:cTn>
+                              </p:par>
+                              <p:par>
+                                <p:cTn id="31" presetID="10" presetClass="exit" presetSubtype="0" fill="hold" grpId="1" nodeType="withEffect">
+                                  <p:stCondLst>
+                                    <p:cond delay="0"/>
+                                  </p:stCondLst>
+                                  <p:childTnLst>
+                                    <p:animEffect transition="out" filter="fade">
+                                      <p:cBhvr>
+                                        <p:cTn id="32" dur="250"/>
+                                        <p:tgtEl>
+                                          <p:spTgt spid="12"/>
+                                        </p:tgtEl>
+                                      </p:cBhvr>
+                                    </p:animEffect>
+                                    <p:set>
+                                      <p:cBhvr>
+                                        <p:cTn id="33" dur="1" fill="hold">
+                                          <p:stCondLst>
+                                            <p:cond delay="249"/>
+                                          </p:stCondLst>
+                                        </p:cTn>
+                                        <p:tgtEl>
+                                          <p:spTgt spid="12"/>
+                                        </p:tgtEl>
+                                        <p:attrNameLst>
+                                          <p:attrName>style.visibility</p:attrName>
+                                        </p:attrNameLst>
+                                      </p:cBhvr>
+                                      <p:to>
+                                        <p:strVal val="hidden"/>
+                                      </p:to>
+                                    </p:set>
+                                  </p:childTnLst>
+                                </p:cTn>
+                              </p:par>
+                            </p:childTnLst>
+                          </p:cTn>
+                        </p:par>
+                      </p:childTnLst>
+                    </p:cTn>
+                  </p:par>
+                  <p:par>
+                    <p:cTn id="34" fill="hold">
+                      <p:stCondLst>
+                        <p:cond delay="indefinite"/>
+                      </p:stCondLst>
+                      <p:childTnLst>
+                        <p:par>
+                          <p:cTn id="35" fill="hold">
+                            <p:stCondLst>
+                              <p:cond delay="0"/>
+                            </p:stCondLst>
+                            <p:childTnLst>
+                              <p:par>
+                                <p:cTn id="36" presetID="10" presetClass="entr" presetSubtype="0" fill="hold" grpId="2" nodeType="clickEffect">
+                                  <p:stCondLst>
+                                    <p:cond delay="0"/>
+                                  </p:stCondLst>
+                                  <p:childTnLst>
+                                    <p:set>
+                                      <p:cBhvr>
+                                        <p:cTn id="37" dur="1" fill="hold">
+                                          <p:stCondLst>
+                                            <p:cond delay="0"/>
+                                          </p:stCondLst>
+                                        </p:cTn>
+                                        <p:tgtEl>
+                                          <p:spTgt spid="2"/>
+                                        </p:tgtEl>
+                                        <p:attrNameLst>
+                                          <p:attrName>style.visibility</p:attrName>
+                                        </p:attrNameLst>
+                                      </p:cBhvr>
+                                      <p:to>
+                                        <p:strVal val="visible"/>
+                                      </p:to>
+                                    </p:set>
+                                    <p:animEffect transition="in" filter="fade">
+                                      <p:cBhvr>
+                                        <p:cTn id="38" dur="250"/>
+                                        <p:tgtEl>
+                                          <p:spTgt spid="2"/>
+                                        </p:tgtEl>
+                                      </p:cBhvr>
+                                    </p:animEffect>
+                                  </p:childTnLst>
+                                </p:cTn>
+                              </p:par>
+                              <p:par>
+                                <p:cTn id="39" presetID="10" presetClass="exit" presetSubtype="0" fill="hold" grpId="1" nodeType="withEffect">
+                                  <p:stCondLst>
+                                    <p:cond delay="0"/>
+                                  </p:stCondLst>
+                                  <p:childTnLst>
+                                    <p:animEffect transition="out" filter="fade">
+                                      <p:cBhvr>
+                                        <p:cTn id="40" dur="250"/>
+                                        <p:tgtEl>
+                                          <p:spTgt spid="3"/>
+                                        </p:tgtEl>
+                                      </p:cBhvr>
+                                    </p:animEffect>
+                                    <p:set>
+                                      <p:cBhvr>
+                                        <p:cTn id="41" dur="1" fill="hold">
+                                          <p:stCondLst>
+                                            <p:cond delay="249"/>
+                                          </p:stCondLst>
+                                        </p:cTn>
+                                        <p:tgtEl>
+                                          <p:spTgt spid="3"/>
+                                        </p:tgtEl>
+                                        <p:attrNameLst>
+                                          <p:attrName>style.visibility</p:attrName>
+                                        </p:attrNameLst>
+                                      </p:cBhvr>
+                                      <p:to>
+                                        <p:strVal val="hidden"/>
+                                      </p:to>
+                                    </p:set>
+                                  </p:childTnLst>
+                                </p:cTn>
+                              </p:par>
+                            </p:childTnLst>
+                          </p:cTn>
+                        </p:par>
+                      </p:childTnLst>
+                    </p:cTn>
+                  </p:par>
+                  <p:par>
+                    <p:cTn id="42" fill="hold">
+                      <p:stCondLst>
+                        <p:cond delay="indefinite"/>
+                      </p:stCondLst>
+                      <p:childTnLst>
+                        <p:par>
+                          <p:cTn id="43" fill="hold">
+                            <p:stCondLst>
+                              <p:cond delay="0"/>
+                            </p:stCondLst>
+                            <p:childTnLst>
+                              <p:par>
+                                <p:cTn id="44" presetID="10" presetClass="exit" presetSubtype="0" fill="hold" grpId="3" nodeType="clickEffect">
+                                  <p:stCondLst>
+                                    <p:cond delay="0"/>
+                                  </p:stCondLst>
+                                  <p:childTnLst>
+                                    <p:animEffect transition="out" filter="fade">
+                                      <p:cBhvr>
+                                        <p:cTn id="45" dur="250"/>
+                                        <p:tgtEl>
+                                          <p:spTgt spid="2"/>
+                                        </p:tgtEl>
+                                      </p:cBhvr>
+                                    </p:animEffect>
+                                    <p:set>
+                                      <p:cBhvr>
+                                        <p:cTn id="46" dur="1" fill="hold">
+                                          <p:stCondLst>
+                                            <p:cond delay="249"/>
+                                          </p:stCondLst>
+                                        </p:cTn>
+                                        <p:tgtEl>
+                                          <p:spTgt spid="2"/>
+                                        </p:tgtEl>
+                                        <p:attrNameLst>
+                                          <p:attrName>style.visibility</p:attrName>
+                                        </p:attrNameLst>
+                                      </p:cBhvr>
+                                      <p:to>
+                                        <p:strVal val="hidden"/>
+                                      </p:to>
+                                    </p:set>
+                                  </p:childTnLst>
+                                </p:cTn>
+                              </p:par>
+                              <p:par>
+                                <p:cTn id="47" presetID="10" presetClass="entr" presetSubtype="0" fill="hold" grpId="2" nodeType="withEffect">
+                                  <p:stCondLst>
+                                    <p:cond delay="0"/>
+                                  </p:stCondLst>
+                                  <p:childTnLst>
+                                    <p:set>
+                                      <p:cBhvr>
+                                        <p:cTn id="48" dur="1" fill="hold">
+                                          <p:stCondLst>
+                                            <p:cond delay="0"/>
+                                          </p:stCondLst>
+                                        </p:cTn>
+                                        <p:tgtEl>
+                                          <p:spTgt spid="4"/>
+                                        </p:tgtEl>
+                                        <p:attrNameLst>
+                                          <p:attrName>style.visibility</p:attrName>
+                                        </p:attrNameLst>
+                                      </p:cBhvr>
+                                      <p:to>
+                                        <p:strVal val="visible"/>
+                                      </p:to>
+                                    </p:set>
+                                    <p:animEffect transition="in" filter="fade">
+                                      <p:cBhvr>
+                                        <p:cTn id="49" dur="250"/>
+                                        <p:tgtEl>
+                                          <p:spTgt spid="4"/>
+                                        </p:tgtEl>
+                                      </p:cBhvr>
+                                    </p:animEffect>
+                                  </p:childTnLst>
+                                </p:cTn>
+                              </p:par>
+                            </p:childTnLst>
+                          </p:cTn>
+                        </p:par>
+                      </p:childTnLst>
+                    </p:cTn>
+                  </p:par>
+                  <p:par>
+                    <p:cTn id="50" fill="hold">
+                      <p:stCondLst>
+                        <p:cond delay="indefinite"/>
+                      </p:stCondLst>
+                      <p:childTnLst>
+                        <p:par>
+                          <p:cTn id="51" fill="hold">
+                            <p:stCondLst>
+                              <p:cond delay="0"/>
+                            </p:stCondLst>
+                            <p:childTnLst>
+                              <p:par>
+                                <p:cTn id="52" presetID="10" presetClass="exit" presetSubtype="0" fill="hold" grpId="3" nodeType="clickEffect">
+                                  <p:stCondLst>
+                                    <p:cond delay="0"/>
+                                  </p:stCondLst>
+                                  <p:childTnLst>
+                                    <p:animEffect transition="out" filter="fade">
+                                      <p:cBhvr>
+                                        <p:cTn id="53" dur="250"/>
+                                        <p:tgtEl>
+                                          <p:spTgt spid="4"/>
+                                        </p:tgtEl>
+                                      </p:cBhvr>
+                                    </p:animEffect>
+                                    <p:set>
+                                      <p:cBhvr>
+                                        <p:cTn id="54" dur="1" fill="hold">
+                                          <p:stCondLst>
+                                            <p:cond delay="249"/>
+                                          </p:stCondLst>
+                                        </p:cTn>
+                                        <p:tgtEl>
+                                          <p:spTgt spid="4"/>
+                                        </p:tgtEl>
+                                        <p:attrNameLst>
+                                          <p:attrName>style.visibility</p:attrName>
+                                        </p:attrNameLst>
+                                      </p:cBhvr>
+                                      <p:to>
+                                        <p:strVal val="hidden"/>
+                                      </p:to>
+                                    </p:set>
+                                  </p:childTnLst>
+                                </p:cTn>
+                              </p:par>
+                              <p:par>
+                                <p:cTn id="55" presetID="10" presetClass="entr" presetSubtype="0" fill="hold" grpId="2" nodeType="withEffect">
+                                  <p:stCondLst>
+                                    <p:cond delay="0"/>
+                                  </p:stCondLst>
+                                  <p:childTnLst>
+                                    <p:set>
+                                      <p:cBhvr>
+                                        <p:cTn id="56" dur="1" fill="hold">
+                                          <p:stCondLst>
+                                            <p:cond delay="0"/>
+                                          </p:stCondLst>
+                                        </p:cTn>
+                                        <p:tgtEl>
+                                          <p:spTgt spid="11"/>
+                                        </p:tgtEl>
+                                        <p:attrNameLst>
+                                          <p:attrName>style.visibility</p:attrName>
+                                        </p:attrNameLst>
+                                      </p:cBhvr>
+                                      <p:to>
+                                        <p:strVal val="visible"/>
+                                      </p:to>
+                                    </p:set>
+                                    <p:animEffect transition="in" filter="fade">
+                                      <p:cBhvr>
+                                        <p:cTn id="57" dur="250"/>
+                                        <p:tgtEl>
+                                          <p:spTgt spid="11"/>
+                                        </p:tgtEl>
+                                      </p:cBhvr>
+                                    </p:animEffect>
+                                  </p:childTnLst>
+                                </p:cTn>
+                              </p:par>
+                              <p:par>
+                                <p:cTn id="58" presetID="10" presetClass="entr" presetSubtype="0" fill="hold" grpId="2" nodeType="withEffect">
+                                  <p:stCondLst>
+                                    <p:cond delay="0"/>
+                                  </p:stCondLst>
+                                  <p:childTnLst>
+                                    <p:set>
+                                      <p:cBhvr>
+                                        <p:cTn id="59" dur="1" fill="hold">
+                                          <p:stCondLst>
+                                            <p:cond delay="0"/>
+                                          </p:stCondLst>
+                                        </p:cTn>
+                                        <p:tgtEl>
+                                          <p:spTgt spid="12"/>
+                                        </p:tgtEl>
+                                        <p:attrNameLst>
+                                          <p:attrName>style.visibility</p:attrName>
+                                        </p:attrNameLst>
+                                      </p:cBhvr>
+                                      <p:to>
+                                        <p:strVal val="visible"/>
+                                      </p:to>
+                                    </p:set>
+                                    <p:animEffect transition="in" filter="fade">
+                                      <p:cBhvr>
+                                        <p:cTn id="60" dur="250"/>
+                                        <p:tgtEl>
+                                          <p:spTgt spid="12"/>
+                                        </p:tgtEl>
+                                      </p:cBhvr>
+                                    </p:animEffect>
+                                  </p:childTnLst>
+                                </p:cTn>
+                              </p:par>
+                            </p:childTnLst>
+                          </p:cTn>
+                        </p:par>
+                      </p:childTnLst>
+                    </p:cTn>
+                  </p:par>
+                </p:childTnLst>
+              </p:cTn>
+              <p:prevCondLst>
+                <p:cond evt="onPrev" delay="0">
+                  <p:tgtEl>
+                    <p:sldTgt/>
+                  </p:tgtEl>
+                </p:cond>
+              </p:prevCondLst>
+              <p:nextCondLst>
+                <p:cond evt="onNext" delay="0">
+                  <p:tgtEl>
+                    <p:sldTgt/>
+                  </p:tgtEl>
+                </p:cond>
+              </p:nextCondLst>
+            </p:seq>
+          </p:childTnLst>
+        </p:cTn>
+      </p:par>
+    </p:tnLst>
+    <p:bldLst>
+      <p:bldP spid="2" grpId="0" animBg="1"/>
+      <p:bldP spid="2" grpId="1" animBg="1"/>
+      <p:bldP spid="2" grpId="2" animBg="1"/>
+      <p:bldP spid="2" grpId="3" animBg="1"/>
+      <p:bldP spid="3" grpId="0" animBg="1"/>
+      <p:bldP spid="3" grpId="1" animBg="1"/>
+      <p:bldP spid="4" grpId="0" animBg="1"/>
+      <p:bldP spid="4" grpId="1" animBg="1"/>
+      <p:bldP spid="4" grpId="2" animBg="1"/>
+      <p:bldP spid="4" grpId="3" animBg="1"/>
+      <p:bldP spid="11" grpId="0" animBg="1"/>
+      <p:bldP spid="11" grpId="1" animBg="1"/>
+      <p:bldP spid="11" grpId="2" animBg="1"/>
+      <p:bldP spid="12" grpId="0" animBg="1"/>
+      <p:bldP spid="12" grpId="1" animBg="1"/>
+      <p:bldP spid="12" grpId="2" animBg="1"/>
+    </p:bldLst>
+  </p:timing>
 </p:sld>
 </file>
 
-<file path=ppt/slides/slide3.xml><?xml version="1.0" encoding="utf-8"?>
-<p:sld xmlns:a="http://schemas.openxmlformats.org/drawingml/2006/main" xmlns:r="http://schemas.openxmlformats.org/officeDocument/2006/relationships" xmlns:p="http://schemas.openxmlformats.org/presentationml/2006/main">
-  <p:cSld>
-    <p:spTree>
-      <p:nvGrpSpPr>
-        <p:cNvPr id="1" name="">
-          <a:extLst>
-            <a:ext uri="{FF2B5EF4-FFF2-40B4-BE49-F238E27FC236}">
-              <a16:creationId xmlns:a16="http://schemas.microsoft.com/office/drawing/2014/main" id="{C2B90745-7454-905C-4BE8-12CAA09DDEFC}"/>
-            </a:ext>
-          </a:extLst>
-        </p:cNvPr>
-        <p:cNvGrpSpPr/>
-        <p:nvPr/>
-      </p:nvGrpSpPr>
-      <p:grpSpPr>
-        <a:xfrm>
-          <a:off x="0" y="0"/>
-          <a:ext cx="0" cy="0"/>
-          <a:chOff x="0" y="0"/>
-          <a:chExt cx="0" cy="0"/>
-        </a:xfrm>
-      </p:grpSpPr>
-      <p:pic>
-        <p:nvPicPr>
-          <p:cNvPr id="2" name="Picture 1">
-            <a:extLst>
-              <a:ext uri="{FF2B5EF4-FFF2-40B4-BE49-F238E27FC236}">
-                <a16:creationId xmlns:a16="http://schemas.microsoft.com/office/drawing/2014/main" id="{11D3A295-C1CC-765D-6862-344968388362}"/>
-              </a:ext>
-            </a:extLst>
-          </p:cNvPr>
-          <p:cNvPicPr>
-            <a:picLocks noChangeAspect="1"/>
-          </p:cNvPicPr>
-          <p:nvPr/>
-        </p:nvPicPr>
-        <p:blipFill>
-          <a:blip r:embed="rId2">
-            <a:extLst>
-              <a:ext uri="{28A0092B-C50C-407E-A947-70E740481C1C}">
-                <a14:useLocalDpi xmlns:a14="http://schemas.microsoft.com/office/drawing/2010/main" val="0"/>
-              </a:ext>
-            </a:extLst>
-          </a:blip>
-          <a:stretch>
-            <a:fillRect/>
-          </a:stretch>
-        </p:blipFill>
-        <p:spPr>
-          <a:xfrm>
-            <a:off x="819802" y="360940"/>
-            <a:ext cx="10543764" cy="6131100"/>
-          </a:xfrm>
-          <a:prstGeom prst="rect">
-            <a:avLst/>
-          </a:prstGeom>
-        </p:spPr>
-      </p:pic>
-      <p:sp>
-        <p:nvSpPr>
-          <p:cNvPr id="3" name="Rectangle 2">
-            <a:extLst>
-              <a:ext uri="{FF2B5EF4-FFF2-40B4-BE49-F238E27FC236}">
-                <a16:creationId xmlns:a16="http://schemas.microsoft.com/office/drawing/2014/main" id="{E50E30B5-3D6A-DC22-9A1D-72590799BEC2}"/>
-              </a:ext>
-            </a:extLst>
-          </p:cNvPr>
-          <p:cNvSpPr/>
-          <p:nvPr/>
-        </p:nvSpPr>
-        <p:spPr>
-          <a:xfrm>
-            <a:off x="506995" y="162962"/>
-            <a:ext cx="5042780" cy="1358020"/>
-          </a:xfrm>
-          <a:prstGeom prst="rect">
-            <a:avLst/>
-          </a:prstGeom>
-          <a:solidFill>
-            <a:srgbClr val="CC00FF">
-              <a:alpha val="20000"/>
-            </a:srgbClr>
-          </a:solidFill>
-          <a:ln>
-            <a:noFill/>
-          </a:ln>
-        </p:spPr>
-        <p:style>
-          <a:lnRef idx="2">
-            <a:schemeClr val="accent1">
-              <a:shade val="15000"/>
-            </a:schemeClr>
-          </a:lnRef>
-          <a:fillRef idx="1">
-            <a:schemeClr val="accent1"/>
-          </a:fillRef>
-          <a:effectRef idx="0">
-            <a:schemeClr val="accent1"/>
-          </a:effectRef>
-          <a:fontRef idx="minor">
-            <a:schemeClr val="lt1"/>
-          </a:fontRef>
-        </p:style>
-        <p:txBody>
-          <a:bodyPr rtlCol="0" anchor="ctr"/>
-          <a:lstStyle/>
-          <a:p>
-            <a:pPr algn="ctr"/>
-            <a:endParaRPr lang="en-SE"/>
-          </a:p>
-        </p:txBody>
-      </p:sp>
-    </p:spTree>
-    <p:extLst>
-      <p:ext uri="{BB962C8B-B14F-4D97-AF65-F5344CB8AC3E}">
-        <p14:creationId xmlns:p14="http://schemas.microsoft.com/office/powerpoint/2010/main" val="1840466727"/>
-      </p:ext>
-    </p:extLst>
-  </p:cSld>
-  <p:clrMapOvr>
-    <a:masterClrMapping/>
-  </p:clrMapOvr>
-</p:sld>
-</file>
-
-<file path=ppt/slides/slide4.xml><?xml version="1.0" encoding="utf-8"?>
-<p:sld xmlns:a="http://schemas.openxmlformats.org/drawingml/2006/main" xmlns:r="http://schemas.openxmlformats.org/officeDocument/2006/relationships" xmlns:p="http://schemas.openxmlformats.org/presentationml/2006/main">
-  <p:cSld>
-    <p:spTree>
-      <p:nvGrpSpPr>
-        <p:cNvPr id="1" name="">
-          <a:extLst>
-            <a:ext uri="{FF2B5EF4-FFF2-40B4-BE49-F238E27FC236}">
-              <a16:creationId xmlns:a16="http://schemas.microsoft.com/office/drawing/2014/main" id="{D178644B-F9FD-0BD2-935D-DD65FAA158E6}"/>
-            </a:ext>
-          </a:extLst>
-        </p:cNvPr>
-        <p:cNvGrpSpPr/>
-        <p:nvPr/>
-      </p:nvGrpSpPr>
-      <p:grpSpPr>
-        <a:xfrm>
-          <a:off x="0" y="0"/>
-          <a:ext cx="0" cy="0"/>
-          <a:chOff x="0" y="0"/>
-          <a:chExt cx="0" cy="0"/>
-        </a:xfrm>
-      </p:grpSpPr>
-      <p:pic>
-        <p:nvPicPr>
-          <p:cNvPr id="3" name="Picture 2">
-            <a:extLst>
-              <a:ext uri="{FF2B5EF4-FFF2-40B4-BE49-F238E27FC236}">
-                <a16:creationId xmlns:a16="http://schemas.microsoft.com/office/drawing/2014/main" id="{BF3AC925-00B5-0F5E-E588-76F942A89343}"/>
-              </a:ext>
-            </a:extLst>
-          </p:cNvPr>
-          <p:cNvPicPr>
-            <a:picLocks noChangeAspect="1"/>
-          </p:cNvPicPr>
-          <p:nvPr/>
-        </p:nvPicPr>
-        <p:blipFill>
-          <a:blip r:embed="rId2">
-            <a:extLst>
-              <a:ext uri="{28A0092B-C50C-407E-A947-70E740481C1C}">
-                <a14:useLocalDpi xmlns:a14="http://schemas.microsoft.com/office/drawing/2010/main" val="0"/>
-              </a:ext>
-            </a:extLst>
-          </a:blip>
-          <a:stretch>
-            <a:fillRect/>
-          </a:stretch>
-        </p:blipFill>
-        <p:spPr>
-          <a:xfrm>
-            <a:off x="819802" y="360940"/>
-            <a:ext cx="10543764" cy="6131100"/>
-          </a:xfrm>
-          <a:prstGeom prst="rect">
-            <a:avLst/>
-          </a:prstGeom>
-        </p:spPr>
-      </p:pic>
-      <p:sp>
-        <p:nvSpPr>
-          <p:cNvPr id="2" name="L-Shape 1">
-            <a:extLst>
-              <a:ext uri="{FF2B5EF4-FFF2-40B4-BE49-F238E27FC236}">
-                <a16:creationId xmlns:a16="http://schemas.microsoft.com/office/drawing/2014/main" id="{2324BD5E-CEAE-1635-CC63-204227E2C4A8}"/>
-              </a:ext>
-            </a:extLst>
-          </p:cNvPr>
-          <p:cNvSpPr/>
-          <p:nvPr/>
-        </p:nvSpPr>
-        <p:spPr>
-          <a:xfrm rot="10800000">
-            <a:off x="6096000" y="162962"/>
-            <a:ext cx="5483382" cy="4517679"/>
-          </a:xfrm>
-          <a:prstGeom prst="corner">
-            <a:avLst>
-              <a:gd name="adj1" fmla="val 29929"/>
-              <a:gd name="adj2" fmla="val 47555"/>
-            </a:avLst>
-          </a:prstGeom>
-          <a:solidFill>
-            <a:srgbClr val="0066FF">
-              <a:alpha val="20000"/>
-            </a:srgbClr>
-          </a:solidFill>
-          <a:ln>
-            <a:noFill/>
-          </a:ln>
-        </p:spPr>
-        <p:style>
-          <a:lnRef idx="2">
-            <a:schemeClr val="accent1">
-              <a:shade val="15000"/>
-            </a:schemeClr>
-          </a:lnRef>
-          <a:fillRef idx="1">
-            <a:schemeClr val="accent1"/>
-          </a:fillRef>
-          <a:effectRef idx="0">
-            <a:schemeClr val="accent1"/>
-          </a:effectRef>
-          <a:fontRef idx="minor">
-            <a:schemeClr val="lt1"/>
-          </a:fontRef>
-        </p:style>
-        <p:txBody>
-          <a:bodyPr rtlCol="0" anchor="ctr"/>
-          <a:lstStyle/>
-          <a:p>
-            <a:pPr algn="ctr"/>
-            <a:endParaRPr lang="en-SE"/>
-          </a:p>
-        </p:txBody>
-      </p:sp>
-    </p:spTree>
-    <p:extLst>
-      <p:ext uri="{BB962C8B-B14F-4D97-AF65-F5344CB8AC3E}">
-        <p14:creationId xmlns:p14="http://schemas.microsoft.com/office/powerpoint/2010/main" val="4193703821"/>
-      </p:ext>
-    </p:extLst>
-  </p:cSld>
-  <p:clrMapOvr>
-    <a:masterClrMapping/>
-  </p:clrMapOvr>
-</p:sld>
-</file>
-
-<file path=ppt/slides/slide5.xml><?xml version="1.0" encoding="utf-8"?>
-<p:sld xmlns:a="http://schemas.openxmlformats.org/drawingml/2006/main" xmlns:r="http://schemas.openxmlformats.org/officeDocument/2006/relationships" xmlns:p="http://schemas.openxmlformats.org/presentationml/2006/main">
-  <p:cSld>
-    <p:spTree>
-      <p:nvGrpSpPr>
-        <p:cNvPr id="1" name="">
-          <a:extLst>
-            <a:ext uri="{FF2B5EF4-FFF2-40B4-BE49-F238E27FC236}">
-              <a16:creationId xmlns:a16="http://schemas.microsoft.com/office/drawing/2014/main" id="{0D5BD6D7-3485-D0C2-8B99-2B0A3DF49E6A}"/>
-            </a:ext>
-          </a:extLst>
-        </p:cNvPr>
-        <p:cNvGrpSpPr/>
-        <p:nvPr/>
-      </p:nvGrpSpPr>
-      <p:grpSpPr>
-        <a:xfrm>
-          <a:off x="0" y="0"/>
-          <a:ext cx="0" cy="0"/>
-          <a:chOff x="0" y="0"/>
-          <a:chExt cx="0" cy="0"/>
-        </a:xfrm>
-      </p:grpSpPr>
-      <p:pic>
-        <p:nvPicPr>
-          <p:cNvPr id="2" name="Picture 1">
-            <a:extLst>
-              <a:ext uri="{FF2B5EF4-FFF2-40B4-BE49-F238E27FC236}">
-                <a16:creationId xmlns:a16="http://schemas.microsoft.com/office/drawing/2014/main" id="{6367780F-A398-AA9A-0C0C-45AF86659F39}"/>
-              </a:ext>
-            </a:extLst>
-          </p:cNvPr>
-          <p:cNvPicPr>
-            <a:picLocks noChangeAspect="1"/>
-          </p:cNvPicPr>
-          <p:nvPr/>
-        </p:nvPicPr>
-        <p:blipFill>
-          <a:blip r:embed="rId2">
-            <a:extLst>
-              <a:ext uri="{28A0092B-C50C-407E-A947-70E740481C1C}">
-                <a14:useLocalDpi xmlns:a14="http://schemas.microsoft.com/office/drawing/2010/main" val="0"/>
-              </a:ext>
-            </a:extLst>
-          </a:blip>
-          <a:stretch>
-            <a:fillRect/>
-          </a:stretch>
-        </p:blipFill>
-        <p:spPr>
-          <a:xfrm>
-            <a:off x="819802" y="360940"/>
-            <a:ext cx="10543764" cy="6131100"/>
-          </a:xfrm>
-          <a:prstGeom prst="rect">
-            <a:avLst/>
-          </a:prstGeom>
-        </p:spPr>
-      </p:pic>
-      <p:sp>
-        <p:nvSpPr>
-          <p:cNvPr id="9" name="Rectangle 8">
-            <a:extLst>
-              <a:ext uri="{FF2B5EF4-FFF2-40B4-BE49-F238E27FC236}">
-                <a16:creationId xmlns:a16="http://schemas.microsoft.com/office/drawing/2014/main" id="{1B40EB97-2036-79F0-404C-3F399F0BCC51}"/>
-              </a:ext>
-            </a:extLst>
-          </p:cNvPr>
-          <p:cNvSpPr/>
-          <p:nvPr/>
-        </p:nvSpPr>
-        <p:spPr>
-          <a:xfrm>
-            <a:off x="5305331" y="4390931"/>
-            <a:ext cx="4191754" cy="1330860"/>
-          </a:xfrm>
-          <a:prstGeom prst="rect">
-            <a:avLst/>
-          </a:prstGeom>
-          <a:solidFill>
-            <a:srgbClr val="92D050">
-              <a:alpha val="20000"/>
-            </a:srgbClr>
-          </a:solidFill>
-          <a:ln>
-            <a:noFill/>
-          </a:ln>
-        </p:spPr>
-        <p:style>
-          <a:lnRef idx="2">
-            <a:schemeClr val="accent1">
-              <a:shade val="15000"/>
-            </a:schemeClr>
-          </a:lnRef>
-          <a:fillRef idx="1">
-            <a:schemeClr val="accent1"/>
-          </a:fillRef>
-          <a:effectRef idx="0">
-            <a:schemeClr val="accent1"/>
-          </a:effectRef>
-          <a:fontRef idx="minor">
-            <a:schemeClr val="lt1"/>
-          </a:fontRef>
-        </p:style>
-        <p:txBody>
-          <a:bodyPr rtlCol="0" anchor="ctr"/>
-          <a:lstStyle/>
-          <a:p>
-            <a:pPr algn="ctr"/>
-            <a:endParaRPr lang="en-SE"/>
-          </a:p>
-        </p:txBody>
-      </p:sp>
-      <p:sp>
-        <p:nvSpPr>
-          <p:cNvPr id="10" name="Rectangle 9">
-            <a:extLst>
-              <a:ext uri="{FF2B5EF4-FFF2-40B4-BE49-F238E27FC236}">
-                <a16:creationId xmlns:a16="http://schemas.microsoft.com/office/drawing/2014/main" id="{BC55F644-6AE8-2703-BEF6-B6F1AEAB70A9}"/>
-              </a:ext>
-            </a:extLst>
-          </p:cNvPr>
-          <p:cNvSpPr/>
-          <p:nvPr/>
-        </p:nvSpPr>
-        <p:spPr>
-          <a:xfrm>
-            <a:off x="6174463" y="1742791"/>
-            <a:ext cx="2417276" cy="2648139"/>
-          </a:xfrm>
-          <a:prstGeom prst="rect">
-            <a:avLst/>
-          </a:prstGeom>
-          <a:solidFill>
-            <a:srgbClr val="92D050">
-              <a:alpha val="20000"/>
-            </a:srgbClr>
-          </a:solidFill>
-          <a:ln>
-            <a:noFill/>
-          </a:ln>
-        </p:spPr>
-        <p:style>
-          <a:lnRef idx="2">
-            <a:schemeClr val="accent1">
-              <a:shade val="15000"/>
-            </a:schemeClr>
-          </a:lnRef>
-          <a:fillRef idx="1">
-            <a:schemeClr val="accent1"/>
-          </a:fillRef>
-          <a:effectRef idx="0">
-            <a:schemeClr val="accent1"/>
-          </a:effectRef>
-          <a:fontRef idx="minor">
-            <a:schemeClr val="lt1"/>
-          </a:fontRef>
-        </p:style>
-        <p:txBody>
-          <a:bodyPr rtlCol="0" anchor="ctr"/>
-          <a:lstStyle/>
-          <a:p>
-            <a:pPr algn="ctr"/>
-            <a:endParaRPr lang="en-SE"/>
-          </a:p>
-        </p:txBody>
-      </p:sp>
-    </p:spTree>
-    <p:extLst>
-      <p:ext uri="{BB962C8B-B14F-4D97-AF65-F5344CB8AC3E}">
-        <p14:creationId xmlns:p14="http://schemas.microsoft.com/office/powerpoint/2010/main" val="191246546"/>
-      </p:ext>
-    </p:extLst>
-  </p:cSld>
-  <p:clrMapOvr>
-    <a:masterClrMapping/>
-  </p:clrMapOvr>
-</p:sld>
-</file>
-
-<file path=ppt/slides/slide6.xml><?xml version="1.0" encoding="utf-8"?>
-<p:sld xmlns:a="http://schemas.openxmlformats.org/drawingml/2006/main" xmlns:r="http://schemas.openxmlformats.org/officeDocument/2006/relationships" xmlns:p="http://schemas.openxmlformats.org/presentationml/2006/main">
-  <p:cSld>
-    <p:spTree>
-      <p:nvGrpSpPr>
-        <p:cNvPr id="1" name="">
-          <a:extLst>
-            <a:ext uri="{FF2B5EF4-FFF2-40B4-BE49-F238E27FC236}">
-              <a16:creationId xmlns:a16="http://schemas.microsoft.com/office/drawing/2014/main" id="{5B98D364-0DA5-3FDC-21B2-E0DA0777444C}"/>
-            </a:ext>
-          </a:extLst>
-        </p:cNvPr>
-        <p:cNvGrpSpPr/>
-        <p:nvPr/>
-      </p:nvGrpSpPr>
-      <p:grpSpPr>
-        <a:xfrm>
-          <a:off x="0" y="0"/>
-          <a:ext cx="0" cy="0"/>
-          <a:chOff x="0" y="0"/>
-          <a:chExt cx="0" cy="0"/>
-        </a:xfrm>
-      </p:grpSpPr>
-      <p:pic>
-        <p:nvPicPr>
-          <p:cNvPr id="2" name="Picture 1">
-            <a:extLst>
-              <a:ext uri="{FF2B5EF4-FFF2-40B4-BE49-F238E27FC236}">
-                <a16:creationId xmlns:a16="http://schemas.microsoft.com/office/drawing/2014/main" id="{3EFD0126-81AD-8C62-51E7-3ADCE6333420}"/>
-              </a:ext>
-            </a:extLst>
-          </p:cNvPr>
-          <p:cNvPicPr>
-            <a:picLocks noChangeAspect="1"/>
-          </p:cNvPicPr>
-          <p:nvPr/>
-        </p:nvPicPr>
-        <p:blipFill>
-          <a:blip r:embed="rId2">
-            <a:extLst>
-              <a:ext uri="{28A0092B-C50C-407E-A947-70E740481C1C}">
-                <a14:useLocalDpi xmlns:a14="http://schemas.microsoft.com/office/drawing/2010/main" val="0"/>
-              </a:ext>
-            </a:extLst>
-          </a:blip>
-          <a:stretch>
-            <a:fillRect/>
-          </a:stretch>
-        </p:blipFill>
-        <p:spPr>
-          <a:xfrm>
-            <a:off x="819802" y="360940"/>
-            <a:ext cx="10543764" cy="6131100"/>
-          </a:xfrm>
-          <a:prstGeom prst="rect">
-            <a:avLst/>
-          </a:prstGeom>
-        </p:spPr>
-      </p:pic>
-      <p:sp>
-        <p:nvSpPr>
-          <p:cNvPr id="4" name="Rectangle 3">
-            <a:extLst>
-              <a:ext uri="{FF2B5EF4-FFF2-40B4-BE49-F238E27FC236}">
-                <a16:creationId xmlns:a16="http://schemas.microsoft.com/office/drawing/2014/main" id="{DF0ACF74-334C-FB77-3402-C9E567E382F2}"/>
-              </a:ext>
-            </a:extLst>
-          </p:cNvPr>
-          <p:cNvSpPr/>
-          <p:nvPr/>
-        </p:nvSpPr>
-        <p:spPr>
-          <a:xfrm>
-            <a:off x="3023857" y="1742792"/>
-            <a:ext cx="2525918" cy="1358019"/>
-          </a:xfrm>
-          <a:prstGeom prst="rect">
-            <a:avLst/>
-          </a:prstGeom>
-          <a:solidFill>
-            <a:srgbClr val="FFFF00">
-              <a:alpha val="20000"/>
-            </a:srgbClr>
-          </a:solidFill>
-          <a:ln>
-            <a:noFill/>
-          </a:ln>
-        </p:spPr>
-        <p:style>
-          <a:lnRef idx="2">
-            <a:schemeClr val="accent1">
-              <a:shade val="15000"/>
-            </a:schemeClr>
-          </a:lnRef>
-          <a:fillRef idx="1">
-            <a:schemeClr val="accent1"/>
-          </a:fillRef>
-          <a:effectRef idx="0">
-            <a:schemeClr val="accent1"/>
-          </a:effectRef>
-          <a:fontRef idx="minor">
-            <a:schemeClr val="lt1"/>
-          </a:fontRef>
-        </p:style>
-        <p:txBody>
-          <a:bodyPr rtlCol="0" anchor="ctr"/>
-          <a:lstStyle/>
-          <a:p>
-            <a:pPr algn="ctr"/>
-            <a:endParaRPr lang="en-SE"/>
-          </a:p>
-        </p:txBody>
-      </p:sp>
-    </p:spTree>
-    <p:extLst>
-      <p:ext uri="{BB962C8B-B14F-4D97-AF65-F5344CB8AC3E}">
-        <p14:creationId xmlns:p14="http://schemas.microsoft.com/office/powerpoint/2010/main" val="1393424185"/>
-      </p:ext>
-    </p:extLst>
-  </p:cSld>
-  <p:clrMapOvr>
-    <a:masterClrMapping/>
-  </p:clrMapOvr>
-</p:sld>
-</file>
-
-<file path=ppt/slides/slide7.xml><?xml version="1.0" encoding="utf-8"?>
-<p:sld xmlns:a="http://schemas.openxmlformats.org/drawingml/2006/main" xmlns:r="http://schemas.openxmlformats.org/officeDocument/2006/relationships" xmlns:p="http://schemas.openxmlformats.org/presentationml/2006/main">
-  <p:cSld>
-    <p:spTree>
-      <p:nvGrpSpPr>
-        <p:cNvPr id="1" name=""/>
-        <p:cNvGrpSpPr/>
-        <p:nvPr/>
-      </p:nvGrpSpPr>
-      <p:grpSpPr>
-        <a:xfrm>
-          <a:off x="0" y="0"/>
-          <a:ext cx="0" cy="0"/>
-          <a:chOff x="0" y="0"/>
-          <a:chExt cx="0" cy="0"/>
-        </a:xfrm>
-      </p:grpSpPr>
-      <p:pic>
-        <p:nvPicPr>
-          <p:cNvPr id="8" name="Picture 7">
-            <a:extLst>
-              <a:ext uri="{FF2B5EF4-FFF2-40B4-BE49-F238E27FC236}">
-                <a16:creationId xmlns:a16="http://schemas.microsoft.com/office/drawing/2014/main" id="{83C1FB1F-6DDF-8E71-7441-C1C7ECAC038D}"/>
-              </a:ext>
-            </a:extLst>
-          </p:cNvPr>
-          <p:cNvPicPr>
-            <a:picLocks noChangeAspect="1"/>
-          </p:cNvPicPr>
-          <p:nvPr/>
-        </p:nvPicPr>
-        <p:blipFill>
-          <a:blip r:embed="rId2">
-            <a:extLst>
-              <a:ext uri="{28A0092B-C50C-407E-A947-70E740481C1C}">
-                <a14:useLocalDpi xmlns:a14="http://schemas.microsoft.com/office/drawing/2010/main" val="0"/>
-              </a:ext>
-            </a:extLst>
-          </a:blip>
-          <a:stretch>
-            <a:fillRect/>
-          </a:stretch>
-        </p:blipFill>
-        <p:spPr>
-          <a:xfrm>
-            <a:off x="1540620" y="308206"/>
-            <a:ext cx="9107006" cy="6239013"/>
-          </a:xfrm>
-          <a:prstGeom prst="rect">
-            <a:avLst/>
-          </a:prstGeom>
-        </p:spPr>
-      </p:pic>
-    </p:spTree>
-    <p:extLst>
-      <p:ext uri="{BB962C8B-B14F-4D97-AF65-F5344CB8AC3E}">
-        <p14:creationId xmlns:p14="http://schemas.microsoft.com/office/powerpoint/2010/main" val="914108623"/>
-      </p:ext>
-    </p:extLst>
-  </p:cSld>
-  <p:clrMapOvr>
-    <a:masterClrMapping/>
-  </p:clrMapOvr>
-</p:sld>
-</file>
-
-<file path=ppt/slides/slide8.xml><?xml version="1.0" encoding="utf-8"?>
+<file path=ppt/slides/slide2.xml><?xml version="1.0" encoding="utf-8"?>
 <p:sld xmlns:a="http://schemas.openxmlformats.org/drawingml/2006/main" xmlns:r="http://schemas.openxmlformats.org/officeDocument/2006/relationships" xmlns:p="http://schemas.openxmlformats.org/presentationml/2006/main">
   <p:cSld>
     <p:spTree>
@@ -4774,6 +4767,272 @@
   <p:clrMapOvr>
     <a:masterClrMapping/>
   </p:clrMapOvr>
+  <p:timing>
+    <p:tnLst>
+      <p:par>
+        <p:cTn id="1" dur="indefinite" restart="never" nodeType="tmRoot">
+          <p:childTnLst>
+            <p:seq concurrent="1" nextAc="seek">
+              <p:cTn id="2" dur="indefinite" nodeType="mainSeq">
+                <p:childTnLst>
+                  <p:par>
+                    <p:cTn id="3" fill="hold">
+                      <p:stCondLst>
+                        <p:cond delay="indefinite"/>
+                      </p:stCondLst>
+                      <p:childTnLst>
+                        <p:par>
+                          <p:cTn id="4" fill="hold">
+                            <p:stCondLst>
+                              <p:cond delay="0"/>
+                            </p:stCondLst>
+                            <p:childTnLst>
+                              <p:par>
+                                <p:cTn id="5" presetID="10" presetClass="entr" presetSubtype="0" fill="hold" grpId="0" nodeType="clickEffect">
+                                  <p:stCondLst>
+                                    <p:cond delay="0"/>
+                                  </p:stCondLst>
+                                  <p:childTnLst>
+                                    <p:set>
+                                      <p:cBhvr>
+                                        <p:cTn id="6" dur="1" fill="hold">
+                                          <p:stCondLst>
+                                            <p:cond delay="0"/>
+                                          </p:stCondLst>
+                                        </p:cTn>
+                                        <p:tgtEl>
+                                          <p:spTgt spid="2"/>
+                                        </p:tgtEl>
+                                        <p:attrNameLst>
+                                          <p:attrName>style.visibility</p:attrName>
+                                        </p:attrNameLst>
+                                      </p:cBhvr>
+                                      <p:to>
+                                        <p:strVal val="visible"/>
+                                      </p:to>
+                                    </p:set>
+                                    <p:animEffect transition="in" filter="fade">
+                                      <p:cBhvr>
+                                        <p:cTn id="7" dur="500"/>
+                                        <p:tgtEl>
+                                          <p:spTgt spid="2"/>
+                                        </p:tgtEl>
+                                      </p:cBhvr>
+                                    </p:animEffect>
+                                  </p:childTnLst>
+                                </p:cTn>
+                              </p:par>
+                              <p:par>
+                                <p:cTn id="8" presetID="10" presetClass="entr" presetSubtype="0" fill="hold" grpId="0" nodeType="withEffect">
+                                  <p:stCondLst>
+                                    <p:cond delay="0"/>
+                                  </p:stCondLst>
+                                  <p:childTnLst>
+                                    <p:set>
+                                      <p:cBhvr>
+                                        <p:cTn id="9" dur="1" fill="hold">
+                                          <p:stCondLst>
+                                            <p:cond delay="0"/>
+                                          </p:stCondLst>
+                                        </p:cTn>
+                                        <p:tgtEl>
+                                          <p:spTgt spid="5"/>
+                                        </p:tgtEl>
+                                        <p:attrNameLst>
+                                          <p:attrName>style.visibility</p:attrName>
+                                        </p:attrNameLst>
+                                      </p:cBhvr>
+                                      <p:to>
+                                        <p:strVal val="visible"/>
+                                      </p:to>
+                                    </p:set>
+                                    <p:animEffect transition="in" filter="fade">
+                                      <p:cBhvr>
+                                        <p:cTn id="10" dur="500"/>
+                                        <p:tgtEl>
+                                          <p:spTgt spid="5"/>
+                                        </p:tgtEl>
+                                      </p:cBhvr>
+                                    </p:animEffect>
+                                  </p:childTnLst>
+                                </p:cTn>
+                              </p:par>
+                              <p:par>
+                                <p:cTn id="11" presetID="10" presetClass="entr" presetSubtype="0" fill="hold" grpId="0" nodeType="withEffect">
+                                  <p:stCondLst>
+                                    <p:cond delay="0"/>
+                                  </p:stCondLst>
+                                  <p:childTnLst>
+                                    <p:set>
+                                      <p:cBhvr>
+                                        <p:cTn id="12" dur="1" fill="hold">
+                                          <p:stCondLst>
+                                            <p:cond delay="0"/>
+                                          </p:stCondLst>
+                                        </p:cTn>
+                                        <p:tgtEl>
+                                          <p:spTgt spid="6"/>
+                                        </p:tgtEl>
+                                        <p:attrNameLst>
+                                          <p:attrName>style.visibility</p:attrName>
+                                        </p:attrNameLst>
+                                      </p:cBhvr>
+                                      <p:to>
+                                        <p:strVal val="visible"/>
+                                      </p:to>
+                                    </p:set>
+                                    <p:animEffect transition="in" filter="fade">
+                                      <p:cBhvr>
+                                        <p:cTn id="13" dur="500"/>
+                                        <p:tgtEl>
+                                          <p:spTgt spid="6"/>
+                                        </p:tgtEl>
+                                      </p:cBhvr>
+                                    </p:animEffect>
+                                  </p:childTnLst>
+                                </p:cTn>
+                              </p:par>
+                              <p:par>
+                                <p:cTn id="14" presetID="10" presetClass="entr" presetSubtype="0" fill="hold" grpId="0" nodeType="withEffect">
+                                  <p:stCondLst>
+                                    <p:cond delay="0"/>
+                                  </p:stCondLst>
+                                  <p:childTnLst>
+                                    <p:set>
+                                      <p:cBhvr>
+                                        <p:cTn id="15" dur="1" fill="hold">
+                                          <p:stCondLst>
+                                            <p:cond delay="0"/>
+                                          </p:stCondLst>
+                                        </p:cTn>
+                                        <p:tgtEl>
+                                          <p:spTgt spid="7"/>
+                                        </p:tgtEl>
+                                        <p:attrNameLst>
+                                          <p:attrName>style.visibility</p:attrName>
+                                        </p:attrNameLst>
+                                      </p:cBhvr>
+                                      <p:to>
+                                        <p:strVal val="visible"/>
+                                      </p:to>
+                                    </p:set>
+                                    <p:animEffect transition="in" filter="fade">
+                                      <p:cBhvr>
+                                        <p:cTn id="16" dur="500"/>
+                                        <p:tgtEl>
+                                          <p:spTgt spid="7"/>
+                                        </p:tgtEl>
+                                      </p:cBhvr>
+                                    </p:animEffect>
+                                  </p:childTnLst>
+                                </p:cTn>
+                              </p:par>
+                              <p:par>
+                                <p:cTn id="17" presetID="10" presetClass="entr" presetSubtype="0" fill="hold" grpId="0" nodeType="withEffect">
+                                  <p:stCondLst>
+                                    <p:cond delay="0"/>
+                                  </p:stCondLst>
+                                  <p:childTnLst>
+                                    <p:set>
+                                      <p:cBhvr>
+                                        <p:cTn id="18" dur="1" fill="hold">
+                                          <p:stCondLst>
+                                            <p:cond delay="0"/>
+                                          </p:stCondLst>
+                                        </p:cTn>
+                                        <p:tgtEl>
+                                          <p:spTgt spid="8"/>
+                                        </p:tgtEl>
+                                        <p:attrNameLst>
+                                          <p:attrName>style.visibility</p:attrName>
+                                        </p:attrNameLst>
+                                      </p:cBhvr>
+                                      <p:to>
+                                        <p:strVal val="visible"/>
+                                      </p:to>
+                                    </p:set>
+                                    <p:animEffect transition="in" filter="fade">
+                                      <p:cBhvr>
+                                        <p:cTn id="19" dur="500"/>
+                                        <p:tgtEl>
+                                          <p:spTgt spid="8"/>
+                                        </p:tgtEl>
+                                      </p:cBhvr>
+                                    </p:animEffect>
+                                  </p:childTnLst>
+                                </p:cTn>
+                              </p:par>
+                              <p:par>
+                                <p:cTn id="20" presetID="10" presetClass="entr" presetSubtype="0" fill="hold" grpId="0" nodeType="withEffect">
+                                  <p:stCondLst>
+                                    <p:cond delay="0"/>
+                                  </p:stCondLst>
+                                  <p:childTnLst>
+                                    <p:set>
+                                      <p:cBhvr>
+                                        <p:cTn id="21" dur="1" fill="hold">
+                                          <p:stCondLst>
+                                            <p:cond delay="0"/>
+                                          </p:stCondLst>
+                                        </p:cTn>
+                                        <p:tgtEl>
+                                          <p:spTgt spid="9"/>
+                                        </p:tgtEl>
+                                        <p:attrNameLst>
+                                          <p:attrName>style.visibility</p:attrName>
+                                        </p:attrNameLst>
+                                      </p:cBhvr>
+                                      <p:to>
+                                        <p:strVal val="visible"/>
+                                      </p:to>
+                                    </p:set>
+                                    <p:animEffect transition="in" filter="fade">
+                                      <p:cBhvr>
+                                        <p:cTn id="22" dur="500"/>
+                                        <p:tgtEl>
+                                          <p:spTgt spid="9"/>
+                                        </p:tgtEl>
+                                      </p:cBhvr>
+                                    </p:animEffect>
+                                  </p:childTnLst>
+                                </p:cTn>
+                              </p:par>
+                            </p:childTnLst>
+                          </p:cTn>
+                        </p:par>
+                      </p:childTnLst>
+                    </p:cTn>
+                  </p:par>
+                </p:childTnLst>
+              </p:cTn>
+              <p:prevCondLst>
+                <p:cond evt="onPrev" delay="0">
+                  <p:tgtEl>
+                    <p:sldTgt/>
+                  </p:tgtEl>
+                </p:cond>
+              </p:prevCondLst>
+              <p:nextCondLst>
+                <p:cond evt="onNext" delay="0">
+                  <p:tgtEl>
+                    <p:sldTgt/>
+                  </p:tgtEl>
+                </p:cond>
+              </p:nextCondLst>
+            </p:seq>
+          </p:childTnLst>
+        </p:cTn>
+      </p:par>
+    </p:tnLst>
+    <p:bldLst>
+      <p:bldP spid="2" grpId="0" animBg="1"/>
+      <p:bldP spid="5" grpId="0" animBg="1"/>
+      <p:bldP spid="6" grpId="0" animBg="1"/>
+      <p:bldP spid="7" grpId="0" animBg="1"/>
+      <p:bldP spid="8" grpId="0" animBg="1"/>
+      <p:bldP spid="9" grpId="0" animBg="1"/>
+    </p:bldLst>
+  </p:timing>
 </p:sld>
 </file>
 

</xml_diff>

<commit_message>
updated presentation in pdf format
</commit_message>
<xml_diff>
--- a/yh_labb/presentation/presentation.pptx
+++ b/yh_labb/presentation/presentation.pptx
@@ -4,6 +4,9 @@
   <p:sldMasterIdLst>
     <p:sldMasterId id="2147483648" r:id="rId1"/>
   </p:sldMasterIdLst>
+  <p:notesMasterIdLst>
+    <p:notesMasterId r:id="rId4"/>
+  </p:notesMasterIdLst>
   <p:sldIdLst>
     <p:sldId id="263" r:id="rId2"/>
     <p:sldId id="264" r:id="rId3"/>
@@ -111,6 +114,472 @@
     </p:ext>
   </p:extLst>
 </p:presentation>
+</file>
+
+<file path=ppt/notesMasters/notesMaster1.xml><?xml version="1.0" encoding="utf-8"?>
+<p:notesMaster xmlns:a="http://schemas.openxmlformats.org/drawingml/2006/main" xmlns:r="http://schemas.openxmlformats.org/officeDocument/2006/relationships" xmlns:p="http://schemas.openxmlformats.org/presentationml/2006/main">
+  <p:cSld>
+    <p:bg>
+      <p:bgRef idx="1001">
+        <a:schemeClr val="bg1"/>
+      </p:bgRef>
+    </p:bg>
+    <p:spTree>
+      <p:nvGrpSpPr>
+        <p:cNvPr id="1" name=""/>
+        <p:cNvGrpSpPr/>
+        <p:nvPr/>
+      </p:nvGrpSpPr>
+      <p:grpSpPr>
+        <a:xfrm>
+          <a:off x="0" y="0"/>
+          <a:ext cx="0" cy="0"/>
+          <a:chOff x="0" y="0"/>
+          <a:chExt cx="0" cy="0"/>
+        </a:xfrm>
+      </p:grpSpPr>
+      <p:sp>
+        <p:nvSpPr>
+          <p:cNvPr id="2" name="Header Placeholder 1"/>
+          <p:cNvSpPr>
+            <a:spLocks noGrp="1"/>
+          </p:cNvSpPr>
+          <p:nvPr>
+            <p:ph type="hdr" sz="quarter"/>
+          </p:nvPr>
+        </p:nvSpPr>
+        <p:spPr>
+          <a:xfrm>
+            <a:off x="0" y="0"/>
+            <a:ext cx="2971800" cy="458788"/>
+          </a:xfrm>
+          <a:prstGeom prst="rect">
+            <a:avLst/>
+          </a:prstGeom>
+        </p:spPr>
+        <p:txBody>
+          <a:bodyPr vert="horz" lIns="91440" tIns="45720" rIns="91440" bIns="45720" rtlCol="0"/>
+          <a:lstStyle>
+            <a:lvl1pPr algn="l">
+              <a:defRPr sz="1200"/>
+            </a:lvl1pPr>
+          </a:lstStyle>
+          <a:p>
+            <a:endParaRPr lang="en-SE"/>
+          </a:p>
+        </p:txBody>
+      </p:sp>
+      <p:sp>
+        <p:nvSpPr>
+          <p:cNvPr id="3" name="Date Placeholder 2"/>
+          <p:cNvSpPr>
+            <a:spLocks noGrp="1"/>
+          </p:cNvSpPr>
+          <p:nvPr>
+            <p:ph type="dt" idx="1"/>
+          </p:nvPr>
+        </p:nvSpPr>
+        <p:spPr>
+          <a:xfrm>
+            <a:off x="3884613" y="0"/>
+            <a:ext cx="2971800" cy="458788"/>
+          </a:xfrm>
+          <a:prstGeom prst="rect">
+            <a:avLst/>
+          </a:prstGeom>
+        </p:spPr>
+        <p:txBody>
+          <a:bodyPr vert="horz" lIns="91440" tIns="45720" rIns="91440" bIns="45720" rtlCol="0"/>
+          <a:lstStyle>
+            <a:lvl1pPr algn="r">
+              <a:defRPr sz="1200"/>
+            </a:lvl1pPr>
+          </a:lstStyle>
+          <a:p>
+            <a:fld id="{366C3C3B-65CA-486A-BF2D-8F6779B03B84}" type="datetimeFigureOut">
+              <a:rPr lang="en-SE" smtClean="0"/>
+              <a:t>2026-02-23</a:t>
+            </a:fld>
+            <a:endParaRPr lang="en-SE"/>
+          </a:p>
+        </p:txBody>
+      </p:sp>
+      <p:sp>
+        <p:nvSpPr>
+          <p:cNvPr id="4" name="Slide Image Placeholder 3"/>
+          <p:cNvSpPr>
+            <a:spLocks noGrp="1" noRot="1" noChangeAspect="1"/>
+          </p:cNvSpPr>
+          <p:nvPr>
+            <p:ph type="sldImg" idx="2"/>
+          </p:nvPr>
+        </p:nvSpPr>
+        <p:spPr>
+          <a:xfrm>
+            <a:off x="685800" y="1143000"/>
+            <a:ext cx="5486400" cy="3086100"/>
+          </a:xfrm>
+          <a:prstGeom prst="rect">
+            <a:avLst/>
+          </a:prstGeom>
+          <a:noFill/>
+          <a:ln w="12700">
+            <a:solidFill>
+              <a:prstClr val="black"/>
+            </a:solidFill>
+          </a:ln>
+        </p:spPr>
+        <p:txBody>
+          <a:bodyPr vert="horz" lIns="91440" tIns="45720" rIns="91440" bIns="45720" rtlCol="0" anchor="ctr"/>
+          <a:lstStyle/>
+          <a:p>
+            <a:endParaRPr lang="en-SE"/>
+          </a:p>
+        </p:txBody>
+      </p:sp>
+      <p:sp>
+        <p:nvSpPr>
+          <p:cNvPr id="5" name="Notes Placeholder 4"/>
+          <p:cNvSpPr>
+            <a:spLocks noGrp="1"/>
+          </p:cNvSpPr>
+          <p:nvPr>
+            <p:ph type="body" sz="quarter" idx="3"/>
+          </p:nvPr>
+        </p:nvSpPr>
+        <p:spPr>
+          <a:xfrm>
+            <a:off x="685800" y="4400550"/>
+            <a:ext cx="5486400" cy="3600450"/>
+          </a:xfrm>
+          <a:prstGeom prst="rect">
+            <a:avLst/>
+          </a:prstGeom>
+        </p:spPr>
+        <p:txBody>
+          <a:bodyPr vert="horz" lIns="91440" tIns="45720" rIns="91440" bIns="45720" rtlCol="0"/>
+          <a:lstStyle/>
+          <a:p>
+            <a:pPr lvl="0"/>
+            <a:r>
+              <a:rPr lang="en-GB"/>
+              <a:t>Click to edit Master text styles</a:t>
+            </a:r>
+          </a:p>
+          <a:p>
+            <a:pPr lvl="1"/>
+            <a:r>
+              <a:rPr lang="en-GB"/>
+              <a:t>Second level</a:t>
+            </a:r>
+          </a:p>
+          <a:p>
+            <a:pPr lvl="2"/>
+            <a:r>
+              <a:rPr lang="en-GB"/>
+              <a:t>Third level</a:t>
+            </a:r>
+          </a:p>
+          <a:p>
+            <a:pPr lvl="3"/>
+            <a:r>
+              <a:rPr lang="en-GB"/>
+              <a:t>Fourth level</a:t>
+            </a:r>
+          </a:p>
+          <a:p>
+            <a:pPr lvl="4"/>
+            <a:r>
+              <a:rPr lang="en-GB"/>
+              <a:t>Fifth level</a:t>
+            </a:r>
+            <a:endParaRPr lang="en-SE"/>
+          </a:p>
+        </p:txBody>
+      </p:sp>
+      <p:sp>
+        <p:nvSpPr>
+          <p:cNvPr id="6" name="Footer Placeholder 5"/>
+          <p:cNvSpPr>
+            <a:spLocks noGrp="1"/>
+          </p:cNvSpPr>
+          <p:nvPr>
+            <p:ph type="ftr" sz="quarter" idx="4"/>
+          </p:nvPr>
+        </p:nvSpPr>
+        <p:spPr>
+          <a:xfrm>
+            <a:off x="0" y="8685213"/>
+            <a:ext cx="2971800" cy="458787"/>
+          </a:xfrm>
+          <a:prstGeom prst="rect">
+            <a:avLst/>
+          </a:prstGeom>
+        </p:spPr>
+        <p:txBody>
+          <a:bodyPr vert="horz" lIns="91440" tIns="45720" rIns="91440" bIns="45720" rtlCol="0" anchor="b"/>
+          <a:lstStyle>
+            <a:lvl1pPr algn="l">
+              <a:defRPr sz="1200"/>
+            </a:lvl1pPr>
+          </a:lstStyle>
+          <a:p>
+            <a:endParaRPr lang="en-SE"/>
+          </a:p>
+        </p:txBody>
+      </p:sp>
+      <p:sp>
+        <p:nvSpPr>
+          <p:cNvPr id="7" name="Slide Number Placeholder 6"/>
+          <p:cNvSpPr>
+            <a:spLocks noGrp="1"/>
+          </p:cNvSpPr>
+          <p:nvPr>
+            <p:ph type="sldNum" sz="quarter" idx="5"/>
+          </p:nvPr>
+        </p:nvSpPr>
+        <p:spPr>
+          <a:xfrm>
+            <a:off x="3884613" y="8685213"/>
+            <a:ext cx="2971800" cy="458787"/>
+          </a:xfrm>
+          <a:prstGeom prst="rect">
+            <a:avLst/>
+          </a:prstGeom>
+        </p:spPr>
+        <p:txBody>
+          <a:bodyPr vert="horz" lIns="91440" tIns="45720" rIns="91440" bIns="45720" rtlCol="0" anchor="b"/>
+          <a:lstStyle>
+            <a:lvl1pPr algn="r">
+              <a:defRPr sz="1200"/>
+            </a:lvl1pPr>
+          </a:lstStyle>
+          <a:p>
+            <a:fld id="{CC83B48D-E7DC-491C-AFC8-7BDAE7CE37E0}" type="slidenum">
+              <a:rPr lang="en-SE" smtClean="0"/>
+              <a:t>‹#›</a:t>
+            </a:fld>
+            <a:endParaRPr lang="en-SE"/>
+          </a:p>
+        </p:txBody>
+      </p:sp>
+    </p:spTree>
+    <p:extLst>
+      <p:ext uri="{BB962C8B-B14F-4D97-AF65-F5344CB8AC3E}">
+        <p14:creationId xmlns:p14="http://schemas.microsoft.com/office/powerpoint/2010/main" val="1365618278"/>
+      </p:ext>
+    </p:extLst>
+  </p:cSld>
+  <p:clrMap bg1="lt1" tx1="dk1" bg2="lt2" tx2="dk2" accent1="accent1" accent2="accent2" accent3="accent3" accent4="accent4" accent5="accent5" accent6="accent6" hlink="hlink" folHlink="folHlink"/>
+  <p:notesStyle>
+    <a:lvl1pPr marL="0" algn="l" defTabSz="914400" rtl="0" eaLnBrk="1" latinLnBrk="0" hangingPunct="1">
+      <a:defRPr sz="1200" kern="1200">
+        <a:solidFill>
+          <a:schemeClr val="tx1"/>
+        </a:solidFill>
+        <a:latin typeface="+mn-lt"/>
+        <a:ea typeface="+mn-ea"/>
+        <a:cs typeface="+mn-cs"/>
+      </a:defRPr>
+    </a:lvl1pPr>
+    <a:lvl2pPr marL="457200" algn="l" defTabSz="914400" rtl="0" eaLnBrk="1" latinLnBrk="0" hangingPunct="1">
+      <a:defRPr sz="1200" kern="1200">
+        <a:solidFill>
+          <a:schemeClr val="tx1"/>
+        </a:solidFill>
+        <a:latin typeface="+mn-lt"/>
+        <a:ea typeface="+mn-ea"/>
+        <a:cs typeface="+mn-cs"/>
+      </a:defRPr>
+    </a:lvl2pPr>
+    <a:lvl3pPr marL="914400" algn="l" defTabSz="914400" rtl="0" eaLnBrk="1" latinLnBrk="0" hangingPunct="1">
+      <a:defRPr sz="1200" kern="1200">
+        <a:solidFill>
+          <a:schemeClr val="tx1"/>
+        </a:solidFill>
+        <a:latin typeface="+mn-lt"/>
+        <a:ea typeface="+mn-ea"/>
+        <a:cs typeface="+mn-cs"/>
+      </a:defRPr>
+    </a:lvl3pPr>
+    <a:lvl4pPr marL="1371600" algn="l" defTabSz="914400" rtl="0" eaLnBrk="1" latinLnBrk="0" hangingPunct="1">
+      <a:defRPr sz="1200" kern="1200">
+        <a:solidFill>
+          <a:schemeClr val="tx1"/>
+        </a:solidFill>
+        <a:latin typeface="+mn-lt"/>
+        <a:ea typeface="+mn-ea"/>
+        <a:cs typeface="+mn-cs"/>
+      </a:defRPr>
+    </a:lvl4pPr>
+    <a:lvl5pPr marL="1828800" algn="l" defTabSz="914400" rtl="0" eaLnBrk="1" latinLnBrk="0" hangingPunct="1">
+      <a:defRPr sz="1200" kern="1200">
+        <a:solidFill>
+          <a:schemeClr val="tx1"/>
+        </a:solidFill>
+        <a:latin typeface="+mn-lt"/>
+        <a:ea typeface="+mn-ea"/>
+        <a:cs typeface="+mn-cs"/>
+      </a:defRPr>
+    </a:lvl5pPr>
+    <a:lvl6pPr marL="2286000" algn="l" defTabSz="914400" rtl="0" eaLnBrk="1" latinLnBrk="0" hangingPunct="1">
+      <a:defRPr sz="1200" kern="1200">
+        <a:solidFill>
+          <a:schemeClr val="tx1"/>
+        </a:solidFill>
+        <a:latin typeface="+mn-lt"/>
+        <a:ea typeface="+mn-ea"/>
+        <a:cs typeface="+mn-cs"/>
+      </a:defRPr>
+    </a:lvl6pPr>
+    <a:lvl7pPr marL="2743200" algn="l" defTabSz="914400" rtl="0" eaLnBrk="1" latinLnBrk="0" hangingPunct="1">
+      <a:defRPr sz="1200" kern="1200">
+        <a:solidFill>
+          <a:schemeClr val="tx1"/>
+        </a:solidFill>
+        <a:latin typeface="+mn-lt"/>
+        <a:ea typeface="+mn-ea"/>
+        <a:cs typeface="+mn-cs"/>
+      </a:defRPr>
+    </a:lvl7pPr>
+    <a:lvl8pPr marL="3200400" algn="l" defTabSz="914400" rtl="0" eaLnBrk="1" latinLnBrk="0" hangingPunct="1">
+      <a:defRPr sz="1200" kern="1200">
+        <a:solidFill>
+          <a:schemeClr val="tx1"/>
+        </a:solidFill>
+        <a:latin typeface="+mn-lt"/>
+        <a:ea typeface="+mn-ea"/>
+        <a:cs typeface="+mn-cs"/>
+      </a:defRPr>
+    </a:lvl8pPr>
+    <a:lvl9pPr marL="3657600" algn="l" defTabSz="914400" rtl="0" eaLnBrk="1" latinLnBrk="0" hangingPunct="1">
+      <a:defRPr sz="1200" kern="1200">
+        <a:solidFill>
+          <a:schemeClr val="tx1"/>
+        </a:solidFill>
+        <a:latin typeface="+mn-lt"/>
+        <a:ea typeface="+mn-ea"/>
+        <a:cs typeface="+mn-cs"/>
+      </a:defRPr>
+    </a:lvl9pPr>
+  </p:notesStyle>
+</p:notesMaster>
+</file>
+
+<file path=ppt/notesSlides/notesSlide1.xml><?xml version="1.0" encoding="utf-8"?>
+<p:notes xmlns:a="http://schemas.openxmlformats.org/drawingml/2006/main" xmlns:r="http://schemas.openxmlformats.org/officeDocument/2006/relationships" xmlns:p="http://schemas.openxmlformats.org/presentationml/2006/main">
+  <p:cSld>
+    <p:spTree>
+      <p:nvGrpSpPr>
+        <p:cNvPr id="1" name=""/>
+        <p:cNvGrpSpPr/>
+        <p:nvPr/>
+      </p:nvGrpSpPr>
+      <p:grpSpPr>
+        <a:xfrm>
+          <a:off x="0" y="0"/>
+          <a:ext cx="0" cy="0"/>
+          <a:chOff x="0" y="0"/>
+          <a:chExt cx="0" cy="0"/>
+        </a:xfrm>
+      </p:grpSpPr>
+      <p:sp>
+        <p:nvSpPr>
+          <p:cNvPr id="2" name="Slide Image Placeholder 1"/>
+          <p:cNvSpPr>
+            <a:spLocks noGrp="1" noRot="1" noChangeAspect="1"/>
+          </p:cNvSpPr>
+          <p:nvPr>
+            <p:ph type="sldImg"/>
+          </p:nvPr>
+        </p:nvSpPr>
+        <p:spPr/>
+      </p:sp>
+      <p:sp>
+        <p:nvSpPr>
+          <p:cNvPr id="3" name="Notes Placeholder 2"/>
+          <p:cNvSpPr>
+            <a:spLocks noGrp="1"/>
+          </p:cNvSpPr>
+          <p:nvPr>
+            <p:ph type="body" idx="1"/>
+          </p:nvPr>
+        </p:nvSpPr>
+        <p:spPr/>
+        <p:txBody>
+          <a:bodyPr/>
+          <a:lstStyle/>
+          <a:p>
+            <a:r>
+              <a:rPr lang="sv-SE" noProof="0" dirty="0"/>
+              <a:t>Studenter och skolklasser är separata entiteter för att studenters personliga information lätt ska kunna skyddas men samtidigt kunna koppla namn till vardera klass för tex en klasslista</a:t>
+            </a:r>
+          </a:p>
+          <a:p>
+            <a:r>
+              <a:rPr lang="sv-SE" noProof="0" dirty="0"/>
+              <a:t>Klasser innehåller all information som är relevant för såväl utbildare som studenter</a:t>
+            </a:r>
+          </a:p>
+          <a:p>
+            <a:endParaRPr lang="sv-SE" noProof="0" dirty="0"/>
+          </a:p>
+          <a:p>
+            <a:r>
+              <a:rPr lang="sv-SE" noProof="0" dirty="0"/>
+              <a:t>Varje klass tillhör ett program men programmen halls separata för att det dels ska vara lätt att skapa klasser med unik information som vilken ort eller terminsstart de har samtidigt som gemensam information såsom utbildningsledare och antal yrkeshögskolepoäng hålls konsekvent</a:t>
+            </a:r>
+          </a:p>
+          <a:p>
+            <a:endParaRPr lang="sv-SE" noProof="0" dirty="0"/>
+          </a:p>
+          <a:p>
+            <a:r>
+              <a:rPr lang="sv-SE" noProof="0" dirty="0"/>
+              <a:t>Det finns en entitet för att lagra generella attribut om varje kurs men för att lätt kunna separera information såsom kursstarter och utbildare finns det separata entiteter för programkurser och fristående kurser. Den allmänna kursentiteten har ett attribut för att flagga för huruvida en kurs ska kunna finnas tillgänglig som fristående eller inte för att undvika missförstånd när en kurs måste vara en del av </a:t>
+            </a:r>
+            <a:r>
+              <a:rPr lang="sv-SE" noProof="0"/>
+              <a:t>ett program.</a:t>
+            </a:r>
+            <a:endParaRPr lang="sv-SE" noProof="0" dirty="0"/>
+          </a:p>
+        </p:txBody>
+      </p:sp>
+      <p:sp>
+        <p:nvSpPr>
+          <p:cNvPr id="4" name="Slide Number Placeholder 3"/>
+          <p:cNvSpPr>
+            <a:spLocks noGrp="1"/>
+          </p:cNvSpPr>
+          <p:nvPr>
+            <p:ph type="sldNum" sz="quarter" idx="5"/>
+          </p:nvPr>
+        </p:nvSpPr>
+        <p:spPr/>
+        <p:txBody>
+          <a:bodyPr/>
+          <a:lstStyle/>
+          <a:p>
+            <a:fld id="{CC83B48D-E7DC-491C-AFC8-7BDAE7CE37E0}" type="slidenum">
+              <a:rPr lang="en-SE" smtClean="0"/>
+              <a:t>1</a:t>
+            </a:fld>
+            <a:endParaRPr lang="en-SE"/>
+          </a:p>
+        </p:txBody>
+      </p:sp>
+    </p:spTree>
+    <p:extLst>
+      <p:ext uri="{BB962C8B-B14F-4D97-AF65-F5344CB8AC3E}">
+        <p14:creationId xmlns:p14="http://schemas.microsoft.com/office/powerpoint/2010/main" val="4062193514"/>
+      </p:ext>
+    </p:extLst>
+  </p:cSld>
+  <p:clrMapOvr>
+    <a:masterClrMapping/>
+  </p:clrMapOvr>
+</p:notes>
 </file>
 
 <file path=ppt/slideLayouts/slideLayout1.xml><?xml version="1.0" encoding="utf-8"?>
@@ -3369,7 +3838,7 @@
           <p:nvPr/>
         </p:nvPicPr>
         <p:blipFill>
-          <a:blip r:embed="rId2">
+          <a:blip r:embed="rId3">
             <a:extLst>
               <a:ext uri="{28A0092B-C50C-407E-A947-70E740481C1C}">
                 <a14:useLocalDpi xmlns:a14="http://schemas.microsoft.com/office/drawing/2010/main" val="0"/>
@@ -5329,4 +5798,299 @@
     </a:ext>
   </a:extLst>
 </a:theme>
+</file>
+
+<file path=ppt/theme/theme2.xml><?xml version="1.0" encoding="utf-8"?>
+<a:theme xmlns:a="http://schemas.openxmlformats.org/drawingml/2006/main" name="Office Theme">
+  <a:themeElements>
+    <a:clrScheme name="Office">
+      <a:dk1>
+        <a:sysClr val="windowText" lastClr="000000"/>
+      </a:dk1>
+      <a:lt1>
+        <a:sysClr val="window" lastClr="FFFFFF"/>
+      </a:lt1>
+      <a:dk2>
+        <a:srgbClr val="44546A"/>
+      </a:dk2>
+      <a:lt2>
+        <a:srgbClr val="E7E6E6"/>
+      </a:lt2>
+      <a:accent1>
+        <a:srgbClr val="4472C4"/>
+      </a:accent1>
+      <a:accent2>
+        <a:srgbClr val="ED7D31"/>
+      </a:accent2>
+      <a:accent3>
+        <a:srgbClr val="A5A5A5"/>
+      </a:accent3>
+      <a:accent4>
+        <a:srgbClr val="FFC000"/>
+      </a:accent4>
+      <a:accent5>
+        <a:srgbClr val="5B9BD5"/>
+      </a:accent5>
+      <a:accent6>
+        <a:srgbClr val="70AD47"/>
+      </a:accent6>
+      <a:hlink>
+        <a:srgbClr val="0563C1"/>
+      </a:hlink>
+      <a:folHlink>
+        <a:srgbClr val="954F72"/>
+      </a:folHlink>
+    </a:clrScheme>
+    <a:fontScheme name="Office">
+      <a:majorFont>
+        <a:latin typeface="Calibri Light" panose="020F0302020204030204"/>
+        <a:ea typeface=""/>
+        <a:cs typeface=""/>
+        <a:font script="Jpan" typeface="游ゴシック Light"/>
+        <a:font script="Hang" typeface="맑은 고딕"/>
+        <a:font script="Hans" typeface="等线 Light"/>
+        <a:font script="Hant" typeface="新細明體"/>
+        <a:font script="Arab" typeface="Times New Roman"/>
+        <a:font script="Hebr" typeface="Times New Roman"/>
+        <a:font script="Thai" typeface="Angsana New"/>
+        <a:font script="Ethi" typeface="Nyala"/>
+        <a:font script="Beng" typeface="Vrinda"/>
+        <a:font script="Gujr" typeface="Shruti"/>
+        <a:font script="Khmr" typeface="MoolBoran"/>
+        <a:font script="Knda" typeface="Tunga"/>
+        <a:font script="Guru" typeface="Raavi"/>
+        <a:font script="Cans" typeface="Euphemia"/>
+        <a:font script="Cher" typeface="Plantagenet Cherokee"/>
+        <a:font script="Yiii" typeface="Microsoft Yi Baiti"/>
+        <a:font script="Tibt" typeface="Microsoft Himalaya"/>
+        <a:font script="Thaa" typeface="MV Boli"/>
+        <a:font script="Deva" typeface="Mangal"/>
+        <a:font script="Telu" typeface="Gautami"/>
+        <a:font script="Taml" typeface="Latha"/>
+        <a:font script="Syrc" typeface="Estrangelo Edessa"/>
+        <a:font script="Orya" typeface="Kalinga"/>
+        <a:font script="Mlym" typeface="Kartika"/>
+        <a:font script="Laoo" typeface="DokChampa"/>
+        <a:font script="Sinh" typeface="Iskoola Pota"/>
+        <a:font script="Mong" typeface="Mongolian Baiti"/>
+        <a:font script="Viet" typeface="Times New Roman"/>
+        <a:font script="Uigh" typeface="Microsoft Uighur"/>
+        <a:font script="Geor" typeface="Sylfaen"/>
+        <a:font script="Armn" typeface="Arial"/>
+        <a:font script="Bugi" typeface="Leelawadee UI"/>
+        <a:font script="Bopo" typeface="Microsoft JhengHei"/>
+        <a:font script="Java" typeface="Javanese Text"/>
+        <a:font script="Lisu" typeface="Segoe UI"/>
+        <a:font script="Mymr" typeface="Myanmar Text"/>
+        <a:font script="Nkoo" typeface="Ebrima"/>
+        <a:font script="Olck" typeface="Nirmala UI"/>
+        <a:font script="Osma" typeface="Ebrima"/>
+        <a:font script="Phag" typeface="Phagspa"/>
+        <a:font script="Syrn" typeface="Estrangelo Edessa"/>
+        <a:font script="Syrj" typeface="Estrangelo Edessa"/>
+        <a:font script="Syre" typeface="Estrangelo Edessa"/>
+        <a:font script="Sora" typeface="Nirmala UI"/>
+        <a:font script="Tale" typeface="Microsoft Tai Le"/>
+        <a:font script="Talu" typeface="Microsoft New Tai Lue"/>
+        <a:font script="Tfng" typeface="Ebrima"/>
+      </a:majorFont>
+      <a:minorFont>
+        <a:latin typeface="Calibri" panose="020F0502020204030204"/>
+        <a:ea typeface=""/>
+        <a:cs typeface=""/>
+        <a:font script="Jpan" typeface="游ゴシック"/>
+        <a:font script="Hang" typeface="맑은 고딕"/>
+        <a:font script="Hans" typeface="等线"/>
+        <a:font script="Hant" typeface="新細明體"/>
+        <a:font script="Arab" typeface="Arial"/>
+        <a:font script="Hebr" typeface="Arial"/>
+        <a:font script="Thai" typeface="Cordia New"/>
+        <a:font script="Ethi" typeface="Nyala"/>
+        <a:font script="Beng" typeface="Vrinda"/>
+        <a:font script="Gujr" typeface="Shruti"/>
+        <a:font script="Khmr" typeface="DaunPenh"/>
+        <a:font script="Knda" typeface="Tunga"/>
+        <a:font script="Guru" typeface="Raavi"/>
+        <a:font script="Cans" typeface="Euphemia"/>
+        <a:font script="Cher" typeface="Plantagenet Cherokee"/>
+        <a:font script="Yiii" typeface="Microsoft Yi Baiti"/>
+        <a:font script="Tibt" typeface="Microsoft Himalaya"/>
+        <a:font script="Thaa" typeface="MV Boli"/>
+        <a:font script="Deva" typeface="Mangal"/>
+        <a:font script="Telu" typeface="Gautami"/>
+        <a:font script="Taml" typeface="Latha"/>
+        <a:font script="Syrc" typeface="Estrangelo Edessa"/>
+        <a:font script="Orya" typeface="Kalinga"/>
+        <a:font script="Mlym" typeface="Kartika"/>
+        <a:font script="Laoo" typeface="DokChampa"/>
+        <a:font script="Sinh" typeface="Iskoola Pota"/>
+        <a:font script="Mong" typeface="Mongolian Baiti"/>
+        <a:font script="Viet" typeface="Arial"/>
+        <a:font script="Uigh" typeface="Microsoft Uighur"/>
+        <a:font script="Geor" typeface="Sylfaen"/>
+        <a:font script="Armn" typeface="Arial"/>
+        <a:font script="Bugi" typeface="Leelawadee UI"/>
+        <a:font script="Bopo" typeface="Microsoft JhengHei"/>
+        <a:font script="Java" typeface="Javanese Text"/>
+        <a:font script="Lisu" typeface="Segoe UI"/>
+        <a:font script="Mymr" typeface="Myanmar Text"/>
+        <a:font script="Nkoo" typeface="Ebrima"/>
+        <a:font script="Olck" typeface="Nirmala UI"/>
+        <a:font script="Osma" typeface="Ebrima"/>
+        <a:font script="Phag" typeface="Phagspa"/>
+        <a:font script="Syrn" typeface="Estrangelo Edessa"/>
+        <a:font script="Syrj" typeface="Estrangelo Edessa"/>
+        <a:font script="Syre" typeface="Estrangelo Edessa"/>
+        <a:font script="Sora" typeface="Nirmala UI"/>
+        <a:font script="Tale" typeface="Microsoft Tai Le"/>
+        <a:font script="Talu" typeface="Microsoft New Tai Lue"/>
+        <a:font script="Tfng" typeface="Ebrima"/>
+      </a:minorFont>
+    </a:fontScheme>
+    <a:fmtScheme name="Office">
+      <a:fillStyleLst>
+        <a:solidFill>
+          <a:schemeClr val="phClr"/>
+        </a:solidFill>
+        <a:gradFill rotWithShape="1">
+          <a:gsLst>
+            <a:gs pos="0">
+              <a:schemeClr val="phClr">
+                <a:lumMod val="110000"/>
+                <a:satMod val="105000"/>
+                <a:tint val="67000"/>
+              </a:schemeClr>
+            </a:gs>
+            <a:gs pos="50000">
+              <a:schemeClr val="phClr">
+                <a:lumMod val="105000"/>
+                <a:satMod val="103000"/>
+                <a:tint val="73000"/>
+              </a:schemeClr>
+            </a:gs>
+            <a:gs pos="100000">
+              <a:schemeClr val="phClr">
+                <a:lumMod val="105000"/>
+                <a:satMod val="109000"/>
+                <a:tint val="81000"/>
+              </a:schemeClr>
+            </a:gs>
+          </a:gsLst>
+          <a:lin ang="5400000" scaled="0"/>
+        </a:gradFill>
+        <a:gradFill rotWithShape="1">
+          <a:gsLst>
+            <a:gs pos="0">
+              <a:schemeClr val="phClr">
+                <a:satMod val="103000"/>
+                <a:lumMod val="102000"/>
+                <a:tint val="94000"/>
+              </a:schemeClr>
+            </a:gs>
+            <a:gs pos="50000">
+              <a:schemeClr val="phClr">
+                <a:satMod val="110000"/>
+                <a:lumMod val="100000"/>
+                <a:shade val="100000"/>
+              </a:schemeClr>
+            </a:gs>
+            <a:gs pos="100000">
+              <a:schemeClr val="phClr">
+                <a:lumMod val="99000"/>
+                <a:satMod val="120000"/>
+                <a:shade val="78000"/>
+              </a:schemeClr>
+            </a:gs>
+          </a:gsLst>
+          <a:lin ang="5400000" scaled="0"/>
+        </a:gradFill>
+      </a:fillStyleLst>
+      <a:lnStyleLst>
+        <a:ln w="6350" cap="flat" cmpd="sng" algn="ctr">
+          <a:solidFill>
+            <a:schemeClr val="phClr"/>
+          </a:solidFill>
+          <a:prstDash val="solid"/>
+          <a:miter lim="800000"/>
+        </a:ln>
+        <a:ln w="12700" cap="flat" cmpd="sng" algn="ctr">
+          <a:solidFill>
+            <a:schemeClr val="phClr"/>
+          </a:solidFill>
+          <a:prstDash val="solid"/>
+          <a:miter lim="800000"/>
+        </a:ln>
+        <a:ln w="19050" cap="flat" cmpd="sng" algn="ctr">
+          <a:solidFill>
+            <a:schemeClr val="phClr"/>
+          </a:solidFill>
+          <a:prstDash val="solid"/>
+          <a:miter lim="800000"/>
+        </a:ln>
+      </a:lnStyleLst>
+      <a:effectStyleLst>
+        <a:effectStyle>
+          <a:effectLst/>
+        </a:effectStyle>
+        <a:effectStyle>
+          <a:effectLst/>
+        </a:effectStyle>
+        <a:effectStyle>
+          <a:effectLst>
+            <a:outerShdw blurRad="57150" dist="19050" dir="5400000" algn="ctr" rotWithShape="0">
+              <a:srgbClr val="000000">
+                <a:alpha val="63000"/>
+              </a:srgbClr>
+            </a:outerShdw>
+          </a:effectLst>
+        </a:effectStyle>
+      </a:effectStyleLst>
+      <a:bgFillStyleLst>
+        <a:solidFill>
+          <a:schemeClr val="phClr"/>
+        </a:solidFill>
+        <a:solidFill>
+          <a:schemeClr val="phClr">
+            <a:tint val="95000"/>
+            <a:satMod val="170000"/>
+          </a:schemeClr>
+        </a:solidFill>
+        <a:gradFill rotWithShape="1">
+          <a:gsLst>
+            <a:gs pos="0">
+              <a:schemeClr val="phClr">
+                <a:tint val="93000"/>
+                <a:satMod val="150000"/>
+                <a:shade val="98000"/>
+                <a:lumMod val="102000"/>
+              </a:schemeClr>
+            </a:gs>
+            <a:gs pos="50000">
+              <a:schemeClr val="phClr">
+                <a:tint val="98000"/>
+                <a:satMod val="130000"/>
+                <a:shade val="90000"/>
+                <a:lumMod val="103000"/>
+              </a:schemeClr>
+            </a:gs>
+            <a:gs pos="100000">
+              <a:schemeClr val="phClr">
+                <a:shade val="63000"/>
+                <a:satMod val="120000"/>
+              </a:schemeClr>
+            </a:gs>
+          </a:gsLst>
+          <a:lin ang="5400000" scaled="0"/>
+        </a:gradFill>
+      </a:bgFillStyleLst>
+    </a:fmtScheme>
+  </a:themeElements>
+  <a:objectDefaults/>
+  <a:extraClrSchemeLst/>
+  <a:extLst>
+    <a:ext uri="{05A4C25C-085E-4340-85A3-A5531E510DB2}">
+      <thm15:themeFamily xmlns:thm15="http://schemas.microsoft.com/office/thememl/2012/main" name="Office Theme" id="{62F939B6-93AF-4DB8-9C6B-D6C7DFDC589F}" vid="{4A3C46E8-61CC-4603-A589-7422A47A8E4A}"/>
+    </a:ext>
+  </a:extLst>
+</a:theme>
 </file>
</xml_diff>